<commit_message>
Initialized term's remaining presentations
</commit_message>
<xml_diff>
--- a/SPIE2017/FullPaperImages/FigureConstruction.pptx
+++ b/SPIE2017/FullPaperImages/FigureConstruction.pptx
@@ -9,6 +9,9 @@
     <p:sldId id="258" r:id="rId3"/>
     <p:sldId id="259" r:id="rId4"/>
     <p:sldId id="260" r:id="rId5"/>
+    <p:sldId id="261" r:id="rId6"/>
+    <p:sldId id="262" r:id="rId7"/>
+    <p:sldId id="263" r:id="rId8"/>
   </p:sldIdLst>
   <p:sldSz cx="12192000" cy="6858000"/>
   <p:notesSz cx="6858000" cy="9144000"/>
@@ -246,7 +249,7 @@
           <a:p>
             <a:fld id="{4C5EB40B-4F9C-4B3F-8313-68E377370307}" type="datetimeFigureOut">
               <a:rPr lang="en-US" smtClean="0"/>
-              <a:t>11/16/2016</a:t>
+              <a:t>11/18/2016</a:t>
             </a:fld>
             <a:endParaRPr lang="en-US"/>
           </a:p>
@@ -416,7 +419,7 @@
           <a:p>
             <a:fld id="{4C5EB40B-4F9C-4B3F-8313-68E377370307}" type="datetimeFigureOut">
               <a:rPr lang="en-US" smtClean="0"/>
-              <a:t>11/16/2016</a:t>
+              <a:t>11/18/2016</a:t>
             </a:fld>
             <a:endParaRPr lang="en-US"/>
           </a:p>
@@ -596,7 +599,7 @@
           <a:p>
             <a:fld id="{4C5EB40B-4F9C-4B3F-8313-68E377370307}" type="datetimeFigureOut">
               <a:rPr lang="en-US" smtClean="0"/>
-              <a:t>11/16/2016</a:t>
+              <a:t>11/18/2016</a:t>
             </a:fld>
             <a:endParaRPr lang="en-US"/>
           </a:p>
@@ -766,7 +769,7 @@
           <a:p>
             <a:fld id="{4C5EB40B-4F9C-4B3F-8313-68E377370307}" type="datetimeFigureOut">
               <a:rPr lang="en-US" smtClean="0"/>
-              <a:t>11/16/2016</a:t>
+              <a:t>11/18/2016</a:t>
             </a:fld>
             <a:endParaRPr lang="en-US"/>
           </a:p>
@@ -1012,7 +1015,7 @@
           <a:p>
             <a:fld id="{4C5EB40B-4F9C-4B3F-8313-68E377370307}" type="datetimeFigureOut">
               <a:rPr lang="en-US" smtClean="0"/>
-              <a:t>11/16/2016</a:t>
+              <a:t>11/18/2016</a:t>
             </a:fld>
             <a:endParaRPr lang="en-US"/>
           </a:p>
@@ -1244,7 +1247,7 @@
           <a:p>
             <a:fld id="{4C5EB40B-4F9C-4B3F-8313-68E377370307}" type="datetimeFigureOut">
               <a:rPr lang="en-US" smtClean="0"/>
-              <a:t>11/16/2016</a:t>
+              <a:t>11/18/2016</a:t>
             </a:fld>
             <a:endParaRPr lang="en-US"/>
           </a:p>
@@ -1611,7 +1614,7 @@
           <a:p>
             <a:fld id="{4C5EB40B-4F9C-4B3F-8313-68E377370307}" type="datetimeFigureOut">
               <a:rPr lang="en-US" smtClean="0"/>
-              <a:t>11/16/2016</a:t>
+              <a:t>11/18/2016</a:t>
             </a:fld>
             <a:endParaRPr lang="en-US"/>
           </a:p>
@@ -1729,7 +1732,7 @@
           <a:p>
             <a:fld id="{4C5EB40B-4F9C-4B3F-8313-68E377370307}" type="datetimeFigureOut">
               <a:rPr lang="en-US" smtClean="0"/>
-              <a:t>11/16/2016</a:t>
+              <a:t>11/18/2016</a:t>
             </a:fld>
             <a:endParaRPr lang="en-US"/>
           </a:p>
@@ -1824,7 +1827,7 @@
           <a:p>
             <a:fld id="{4C5EB40B-4F9C-4B3F-8313-68E377370307}" type="datetimeFigureOut">
               <a:rPr lang="en-US" smtClean="0"/>
-              <a:t>11/16/2016</a:t>
+              <a:t>11/18/2016</a:t>
             </a:fld>
             <a:endParaRPr lang="en-US"/>
           </a:p>
@@ -2101,7 +2104,7 @@
           <a:p>
             <a:fld id="{4C5EB40B-4F9C-4B3F-8313-68E377370307}" type="datetimeFigureOut">
               <a:rPr lang="en-US" smtClean="0"/>
-              <a:t>11/16/2016</a:t>
+              <a:t>11/18/2016</a:t>
             </a:fld>
             <a:endParaRPr lang="en-US"/>
           </a:p>
@@ -2354,7 +2357,7 @@
           <a:p>
             <a:fld id="{4C5EB40B-4F9C-4B3F-8313-68E377370307}" type="datetimeFigureOut">
               <a:rPr lang="en-US" smtClean="0"/>
-              <a:t>11/16/2016</a:t>
+              <a:t>11/18/2016</a:t>
             </a:fld>
             <a:endParaRPr lang="en-US"/>
           </a:p>
@@ -2567,7 +2570,7 @@
           <a:p>
             <a:fld id="{4C5EB40B-4F9C-4B3F-8313-68E377370307}" type="datetimeFigureOut">
               <a:rPr lang="en-US" smtClean="0"/>
-              <a:t>11/16/2016</a:t>
+              <a:t>11/18/2016</a:t>
             </a:fld>
             <a:endParaRPr lang="en-US"/>
           </a:p>
@@ -3212,105 +3215,131 @@
           <a:chExt cx="0" cy="0"/>
         </a:xfrm>
       </p:grpSpPr>
-      <p:pic>
-        <p:nvPicPr>
-          <p:cNvPr id="2" name="Picture 1"/>
-          <p:cNvPicPr>
-            <a:picLocks noChangeAspect="1"/>
-          </p:cNvPicPr>
+      <p:grpSp>
+        <p:nvGrpSpPr>
+          <p:cNvPr id="3" name="Group 2"/>
+          <p:cNvGrpSpPr/>
           <p:nvPr/>
-        </p:nvPicPr>
-        <p:blipFill>
-          <a:blip r:embed="rId2">
-            <a:extLst>
-              <a:ext uri="{28A0092B-C50C-407E-A947-70E740481C1C}">
-                <a14:useLocalDpi xmlns:a14="http://schemas.microsoft.com/office/drawing/2010/main" val="0"/>
-              </a:ext>
-            </a:extLst>
-          </a:blip>
-          <a:stretch>
-            <a:fillRect/>
-          </a:stretch>
-        </p:blipFill>
-        <p:spPr>
+        </p:nvGrpSpPr>
+        <p:grpSpPr>
           <a:xfrm>
             <a:off x="1889055" y="0"/>
             <a:ext cx="8413890" cy="6858000"/>
+            <a:chOff x="1889055" y="0"/>
+            <a:chExt cx="8413890" cy="6858000"/>
           </a:xfrm>
-          <a:prstGeom prst="rect">
-            <a:avLst/>
-          </a:prstGeom>
-        </p:spPr>
-      </p:pic>
-      <p:sp>
-        <p:nvSpPr>
-          <p:cNvPr id="4" name="Up Arrow 3"/>
-          <p:cNvSpPr/>
-          <p:nvPr/>
-        </p:nvSpPr>
-        <p:spPr>
-          <a:xfrm>
-            <a:off x="5708822" y="3113903"/>
-            <a:ext cx="263610" cy="1532238"/>
-          </a:xfrm>
-          <a:prstGeom prst="upArrow">
-            <a:avLst/>
-          </a:prstGeom>
-          <a:ln>
-            <a:solidFill>
-              <a:schemeClr val="tx1"/>
-            </a:solidFill>
-          </a:ln>
-        </p:spPr>
-        <p:style>
-          <a:lnRef idx="2">
-            <a:schemeClr val="accent5">
-              <a:shade val="50000"/>
-            </a:schemeClr>
-          </a:lnRef>
-          <a:fillRef idx="1">
-            <a:schemeClr val="accent5"/>
-          </a:fillRef>
-          <a:effectRef idx="0">
-            <a:schemeClr val="accent5"/>
-          </a:effectRef>
-          <a:fontRef idx="minor">
-            <a:schemeClr val="lt1"/>
-          </a:fontRef>
-        </p:style>
-        <p:txBody>
-          <a:bodyPr rtlCol="0" anchor="ctr"/>
-          <a:lstStyle/>
-          <a:p>
-            <a:pPr algn="ctr"/>
-            <a:endParaRPr lang="en-CA"/>
-          </a:p>
-        </p:txBody>
-      </p:sp>
-      <p:sp>
-        <p:nvSpPr>
-          <p:cNvPr id="5" name="TextBox 4"/>
-          <p:cNvSpPr txBox="1"/>
-          <p:nvPr/>
-        </p:nvSpPr>
-        <p:spPr>
-          <a:xfrm>
-            <a:off x="5840627" y="3256005"/>
-            <a:ext cx="2207741" cy="769441"/>
-          </a:xfrm>
-          <a:prstGeom prst="rect">
-            <a:avLst/>
-          </a:prstGeom>
-          <a:noFill/>
-        </p:spPr>
-        <p:txBody>
-          <a:bodyPr wrap="square" rtlCol="0">
-            <a:spAutoFit/>
-          </a:bodyPr>
-          <a:lstStyle/>
-          <a:p>
-            <a:r>
-              <a:rPr lang="en-CA" sz="4400" dirty="0" smtClean="0">
+        </p:grpSpPr>
+        <p:pic>
+          <p:nvPicPr>
+            <p:cNvPr id="2" name="Picture 1"/>
+            <p:cNvPicPr>
+              <a:picLocks noChangeAspect="1"/>
+            </p:cNvPicPr>
+            <p:nvPr/>
+          </p:nvPicPr>
+          <p:blipFill>
+            <a:blip r:embed="rId2">
+              <a:extLst>
+                <a:ext uri="{28A0092B-C50C-407E-A947-70E740481C1C}">
+                  <a14:useLocalDpi xmlns:a14="http://schemas.microsoft.com/office/drawing/2010/main" val="0"/>
+                </a:ext>
+              </a:extLst>
+            </a:blip>
+            <a:stretch>
+              <a:fillRect/>
+            </a:stretch>
+          </p:blipFill>
+          <p:spPr>
+            <a:xfrm>
+              <a:off x="1889055" y="0"/>
+              <a:ext cx="8413890" cy="6858000"/>
+            </a:xfrm>
+            <a:prstGeom prst="rect">
+              <a:avLst/>
+            </a:prstGeom>
+          </p:spPr>
+        </p:pic>
+        <p:sp>
+          <p:nvSpPr>
+            <p:cNvPr id="4" name="Up Arrow 3"/>
+            <p:cNvSpPr/>
+            <p:nvPr/>
+          </p:nvSpPr>
+          <p:spPr>
+            <a:xfrm>
+              <a:off x="5708822" y="3113903"/>
+              <a:ext cx="263610" cy="1532238"/>
+            </a:xfrm>
+            <a:prstGeom prst="upArrow">
+              <a:avLst/>
+            </a:prstGeom>
+            <a:ln>
+              <a:solidFill>
+                <a:schemeClr val="tx1"/>
+              </a:solidFill>
+            </a:ln>
+          </p:spPr>
+          <p:style>
+            <a:lnRef idx="2">
+              <a:schemeClr val="accent5">
+                <a:shade val="50000"/>
+              </a:schemeClr>
+            </a:lnRef>
+            <a:fillRef idx="1">
+              <a:schemeClr val="accent5"/>
+            </a:fillRef>
+            <a:effectRef idx="0">
+              <a:schemeClr val="accent5"/>
+            </a:effectRef>
+            <a:fontRef idx="minor">
+              <a:schemeClr val="lt1"/>
+            </a:fontRef>
+          </p:style>
+          <p:txBody>
+            <a:bodyPr rtlCol="0" anchor="ctr"/>
+            <a:lstStyle/>
+            <a:p>
+              <a:pPr algn="ctr"/>
+              <a:endParaRPr lang="en-CA"/>
+            </a:p>
+          </p:txBody>
+        </p:sp>
+        <p:sp>
+          <p:nvSpPr>
+            <p:cNvPr id="5" name="TextBox 4"/>
+            <p:cNvSpPr txBox="1"/>
+            <p:nvPr/>
+          </p:nvSpPr>
+          <p:spPr>
+            <a:xfrm>
+              <a:off x="5751892" y="3335932"/>
+              <a:ext cx="2207741" cy="769441"/>
+            </a:xfrm>
+            <a:prstGeom prst="rect">
+              <a:avLst/>
+            </a:prstGeom>
+            <a:noFill/>
+          </p:spPr>
+          <p:txBody>
+            <a:bodyPr wrap="square" rtlCol="0">
+              <a:spAutoFit/>
+            </a:bodyPr>
+            <a:lstStyle/>
+            <a:p>
+              <a:r>
+                <a:rPr lang="en-CA" sz="4400" dirty="0" smtClean="0">
+                  <a:ln>
+                    <a:solidFill>
+                      <a:sysClr val="windowText" lastClr="000000"/>
+                    </a:solidFill>
+                  </a:ln>
+                  <a:solidFill>
+                    <a:schemeClr val="accent5"/>
+                  </a:solidFill>
+                </a:rPr>
+                <a:t>&lt;SI(9,0)&gt;</a:t>
+              </a:r>
+              <a:endParaRPr lang="en-CA" sz="4400" dirty="0">
                 <a:ln>
                   <a:solidFill>
                     <a:sysClr val="windowText" lastClr="000000"/>
@@ -3319,46 +3348,46 @@
                 <a:solidFill>
                   <a:schemeClr val="accent5"/>
                 </a:solidFill>
-              </a:rPr>
-              <a:t>&lt;SI(9,0)&gt;</a:t>
-            </a:r>
-            <a:endParaRPr lang="en-CA" sz="4400" dirty="0">
-              <a:ln>
-                <a:solidFill>
-                  <a:sysClr val="windowText" lastClr="000000"/>
-                </a:solidFill>
-              </a:ln>
-              <a:solidFill>
-                <a:schemeClr val="accent5"/>
-              </a:solidFill>
-            </a:endParaRPr>
-          </a:p>
-        </p:txBody>
-      </p:sp>
-      <p:sp>
-        <p:nvSpPr>
-          <p:cNvPr id="6" name="TextBox 5"/>
-          <p:cNvSpPr txBox="1"/>
-          <p:nvPr/>
-        </p:nvSpPr>
-        <p:spPr>
-          <a:xfrm>
-            <a:off x="5840627" y="4690241"/>
-            <a:ext cx="1400432" cy="707886"/>
-          </a:xfrm>
-          <a:prstGeom prst="rect">
-            <a:avLst/>
-          </a:prstGeom>
-          <a:noFill/>
-        </p:spPr>
-        <p:txBody>
-          <a:bodyPr wrap="square" rtlCol="0">
-            <a:spAutoFit/>
-          </a:bodyPr>
-          <a:lstStyle/>
-          <a:p>
-            <a:r>
-              <a:rPr lang="en-CA" sz="4000" dirty="0" smtClean="0">
+              </a:endParaRPr>
+            </a:p>
+          </p:txBody>
+        </p:sp>
+        <p:sp>
+          <p:nvSpPr>
+            <p:cNvPr id="6" name="TextBox 5"/>
+            <p:cNvSpPr txBox="1"/>
+            <p:nvPr/>
+          </p:nvSpPr>
+          <p:spPr>
+            <a:xfrm>
+              <a:off x="5191719" y="4591794"/>
+              <a:ext cx="1400432" cy="707886"/>
+            </a:xfrm>
+            <a:prstGeom prst="rect">
+              <a:avLst/>
+            </a:prstGeom>
+            <a:noFill/>
+          </p:spPr>
+          <p:txBody>
+            <a:bodyPr wrap="square" rtlCol="0">
+              <a:spAutoFit/>
+            </a:bodyPr>
+            <a:lstStyle/>
+            <a:p>
+              <a:r>
+                <a:rPr lang="en-CA" sz="4000" dirty="0" smtClean="0">
+                  <a:ln>
+                    <a:solidFill>
+                      <a:sysClr val="windowText" lastClr="000000"/>
+                    </a:solidFill>
+                  </a:ln>
+                  <a:solidFill>
+                    <a:schemeClr val="bg1"/>
+                  </a:solidFill>
+                </a:rPr>
+                <a:t>P(9,0)</a:t>
+              </a:r>
+              <a:endParaRPr lang="en-CA" sz="4000" dirty="0">
                 <a:ln>
                   <a:solidFill>
                     <a:sysClr val="windowText" lastClr="000000"/>
@@ -3367,46 +3396,46 @@
                 <a:solidFill>
                   <a:schemeClr val="bg1"/>
                 </a:solidFill>
-              </a:rPr>
-              <a:t>P(9,0)</a:t>
-            </a:r>
-            <a:endParaRPr lang="en-CA" sz="4000" dirty="0">
-              <a:ln>
-                <a:solidFill>
-                  <a:sysClr val="windowText" lastClr="000000"/>
-                </a:solidFill>
-              </a:ln>
-              <a:solidFill>
-                <a:schemeClr val="bg1"/>
-              </a:solidFill>
-            </a:endParaRPr>
-          </a:p>
-        </p:txBody>
-      </p:sp>
-      <p:sp>
-        <p:nvSpPr>
-          <p:cNvPr id="7" name="TextBox 6"/>
-          <p:cNvSpPr txBox="1"/>
-          <p:nvPr/>
-        </p:nvSpPr>
-        <p:spPr>
-          <a:xfrm>
-            <a:off x="7708377" y="3896397"/>
-            <a:ext cx="1400432" cy="707886"/>
-          </a:xfrm>
-          <a:prstGeom prst="rect">
-            <a:avLst/>
-          </a:prstGeom>
-          <a:noFill/>
-        </p:spPr>
-        <p:txBody>
-          <a:bodyPr wrap="square" rtlCol="0">
-            <a:spAutoFit/>
-          </a:bodyPr>
-          <a:lstStyle/>
-          <a:p>
-            <a:r>
-              <a:rPr lang="en-CA" sz="4000" dirty="0" smtClean="0">
+              </a:endParaRPr>
+            </a:p>
+          </p:txBody>
+        </p:sp>
+        <p:sp>
+          <p:nvSpPr>
+            <p:cNvPr id="7" name="TextBox 6"/>
+            <p:cNvSpPr txBox="1"/>
+            <p:nvPr/>
+          </p:nvSpPr>
+          <p:spPr>
+            <a:xfrm>
+              <a:off x="7620553" y="3120800"/>
+              <a:ext cx="1400432" cy="707886"/>
+            </a:xfrm>
+            <a:prstGeom prst="rect">
+              <a:avLst/>
+            </a:prstGeom>
+            <a:noFill/>
+          </p:spPr>
+          <p:txBody>
+            <a:bodyPr wrap="square" rtlCol="0">
+              <a:spAutoFit/>
+            </a:bodyPr>
+            <a:lstStyle/>
+            <a:p>
+              <a:r>
+                <a:rPr lang="en-CA" sz="4000" dirty="0" smtClean="0">
+                  <a:ln>
+                    <a:solidFill>
+                      <a:sysClr val="windowText" lastClr="000000"/>
+                    </a:solidFill>
+                  </a:ln>
+                  <a:solidFill>
+                    <a:schemeClr val="bg1"/>
+                  </a:solidFill>
+                </a:rPr>
+                <a:t>P(9,1)</a:t>
+              </a:r>
+              <a:endParaRPr lang="en-CA" sz="4000" dirty="0">
                 <a:ln>
                   <a:solidFill>
                     <a:sysClr val="windowText" lastClr="000000"/>
@@ -3415,46 +3444,46 @@
                 <a:solidFill>
                   <a:schemeClr val="bg1"/>
                 </a:solidFill>
-              </a:rPr>
-              <a:t>P(9,1)</a:t>
-            </a:r>
-            <a:endParaRPr lang="en-CA" sz="4000" dirty="0">
-              <a:ln>
-                <a:solidFill>
-                  <a:sysClr val="windowText" lastClr="000000"/>
-                </a:solidFill>
-              </a:ln>
-              <a:solidFill>
-                <a:schemeClr val="bg1"/>
-              </a:solidFill>
-            </a:endParaRPr>
-          </a:p>
-        </p:txBody>
-      </p:sp>
-      <p:sp>
-        <p:nvSpPr>
-          <p:cNvPr id="8" name="TextBox 7"/>
-          <p:cNvSpPr txBox="1"/>
-          <p:nvPr/>
-        </p:nvSpPr>
-        <p:spPr>
-          <a:xfrm>
-            <a:off x="7437472" y="2607306"/>
-            <a:ext cx="1400432" cy="707886"/>
-          </a:xfrm>
-          <a:prstGeom prst="rect">
-            <a:avLst/>
-          </a:prstGeom>
-          <a:noFill/>
-        </p:spPr>
-        <p:txBody>
-          <a:bodyPr wrap="square" rtlCol="0">
-            <a:spAutoFit/>
-          </a:bodyPr>
-          <a:lstStyle/>
-          <a:p>
-            <a:r>
-              <a:rPr lang="en-CA" sz="4000" dirty="0" smtClean="0">
+              </a:endParaRPr>
+            </a:p>
+          </p:txBody>
+        </p:sp>
+        <p:sp>
+          <p:nvSpPr>
+            <p:cNvPr id="8" name="TextBox 7" hidden="1"/>
+            <p:cNvSpPr txBox="1"/>
+            <p:nvPr/>
+          </p:nvSpPr>
+          <p:spPr>
+            <a:xfrm>
+              <a:off x="7543063" y="1950174"/>
+              <a:ext cx="1400432" cy="707886"/>
+            </a:xfrm>
+            <a:prstGeom prst="rect">
+              <a:avLst/>
+            </a:prstGeom>
+            <a:noFill/>
+          </p:spPr>
+          <p:txBody>
+            <a:bodyPr wrap="square" rtlCol="0">
+              <a:spAutoFit/>
+            </a:bodyPr>
+            <a:lstStyle/>
+            <a:p>
+              <a:r>
+                <a:rPr lang="en-CA" sz="4000" dirty="0" smtClean="0">
+                  <a:ln>
+                    <a:solidFill>
+                      <a:sysClr val="windowText" lastClr="000000"/>
+                    </a:solidFill>
+                  </a:ln>
+                  <a:solidFill>
+                    <a:schemeClr val="bg1"/>
+                  </a:solidFill>
+                </a:rPr>
+                <a:t>P(8,1)</a:t>
+              </a:r>
+              <a:endParaRPr lang="en-CA" sz="4000" dirty="0">
                 <a:ln>
                   <a:solidFill>
                     <a:sysClr val="windowText" lastClr="000000"/>
@@ -3463,46 +3492,46 @@
                 <a:solidFill>
                   <a:schemeClr val="bg1"/>
                 </a:solidFill>
-              </a:rPr>
-              <a:t>P(8,1)</a:t>
-            </a:r>
-            <a:endParaRPr lang="en-CA" sz="4000" dirty="0">
-              <a:ln>
-                <a:solidFill>
-                  <a:sysClr val="windowText" lastClr="000000"/>
-                </a:solidFill>
-              </a:ln>
-              <a:solidFill>
-                <a:schemeClr val="bg1"/>
-              </a:solidFill>
-            </a:endParaRPr>
-          </a:p>
-        </p:txBody>
-      </p:sp>
-      <p:sp>
-        <p:nvSpPr>
-          <p:cNvPr id="9" name="TextBox 8"/>
-          <p:cNvSpPr txBox="1"/>
-          <p:nvPr/>
-        </p:nvSpPr>
-        <p:spPr>
-          <a:xfrm>
-            <a:off x="7545212" y="1078214"/>
-            <a:ext cx="1400432" cy="707886"/>
-          </a:xfrm>
-          <a:prstGeom prst="rect">
-            <a:avLst/>
-          </a:prstGeom>
-          <a:noFill/>
-        </p:spPr>
-        <p:txBody>
-          <a:bodyPr wrap="square" rtlCol="0">
-            <a:spAutoFit/>
-          </a:bodyPr>
-          <a:lstStyle/>
-          <a:p>
-            <a:r>
-              <a:rPr lang="en-CA" sz="4000" dirty="0" smtClean="0">
+              </a:endParaRPr>
+            </a:p>
+          </p:txBody>
+        </p:sp>
+        <p:sp>
+          <p:nvSpPr>
+            <p:cNvPr id="9" name="TextBox 8" hidden="1"/>
+            <p:cNvSpPr txBox="1"/>
+            <p:nvPr/>
+          </p:nvSpPr>
+          <p:spPr>
+            <a:xfrm>
+              <a:off x="7667542" y="279387"/>
+              <a:ext cx="1400432" cy="707886"/>
+            </a:xfrm>
+            <a:prstGeom prst="rect">
+              <a:avLst/>
+            </a:prstGeom>
+            <a:noFill/>
+          </p:spPr>
+          <p:txBody>
+            <a:bodyPr wrap="square" rtlCol="0">
+              <a:spAutoFit/>
+            </a:bodyPr>
+            <a:lstStyle/>
+            <a:p>
+              <a:r>
+                <a:rPr lang="en-CA" sz="4000" dirty="0" smtClean="0">
+                  <a:ln>
+                    <a:solidFill>
+                      <a:sysClr val="windowText" lastClr="000000"/>
+                    </a:solidFill>
+                  </a:ln>
+                  <a:solidFill>
+                    <a:schemeClr val="bg1"/>
+                  </a:solidFill>
+                </a:rPr>
+                <a:t>P(7,1)</a:t>
+              </a:r>
+              <a:endParaRPr lang="en-CA" sz="4000" dirty="0">
                 <a:ln>
                   <a:solidFill>
                     <a:sysClr val="windowText" lastClr="000000"/>
@@ -3511,46 +3540,46 @@
                 <a:solidFill>
                   <a:schemeClr val="bg1"/>
                 </a:solidFill>
-              </a:rPr>
-              <a:t>P(7,1)</a:t>
-            </a:r>
-            <a:endParaRPr lang="en-CA" sz="4000" dirty="0">
-              <a:ln>
-                <a:solidFill>
-                  <a:sysClr val="windowText" lastClr="000000"/>
-                </a:solidFill>
-              </a:ln>
-              <a:solidFill>
-                <a:schemeClr val="bg1"/>
-              </a:solidFill>
-            </a:endParaRPr>
-          </a:p>
-        </p:txBody>
-      </p:sp>
-      <p:sp>
-        <p:nvSpPr>
-          <p:cNvPr id="10" name="TextBox 9"/>
-          <p:cNvSpPr txBox="1"/>
-          <p:nvPr/>
-        </p:nvSpPr>
-        <p:spPr>
-          <a:xfrm>
-            <a:off x="7199222" y="5185489"/>
-            <a:ext cx="1698291" cy="707886"/>
-          </a:xfrm>
-          <a:prstGeom prst="rect">
-            <a:avLst/>
-          </a:prstGeom>
-          <a:noFill/>
-        </p:spPr>
-        <p:txBody>
-          <a:bodyPr wrap="square" rtlCol="0">
-            <a:spAutoFit/>
-          </a:bodyPr>
-          <a:lstStyle/>
-          <a:p>
-            <a:r>
-              <a:rPr lang="en-CA" sz="4000" dirty="0" smtClean="0">
+              </a:endParaRPr>
+            </a:p>
+          </p:txBody>
+        </p:sp>
+        <p:sp>
+          <p:nvSpPr>
+            <p:cNvPr id="10" name="TextBox 9" hidden="1"/>
+            <p:cNvSpPr txBox="1"/>
+            <p:nvPr/>
+          </p:nvSpPr>
+          <p:spPr>
+            <a:xfrm>
+              <a:off x="6856347" y="4516748"/>
+              <a:ext cx="1698291" cy="707886"/>
+            </a:xfrm>
+            <a:prstGeom prst="rect">
+              <a:avLst/>
+            </a:prstGeom>
+            <a:noFill/>
+          </p:spPr>
+          <p:txBody>
+            <a:bodyPr wrap="square" rtlCol="0">
+              <a:spAutoFit/>
+            </a:bodyPr>
+            <a:lstStyle/>
+            <a:p>
+              <a:r>
+                <a:rPr lang="en-CA" sz="4000" dirty="0" smtClean="0">
+                  <a:ln>
+                    <a:solidFill>
+                      <a:sysClr val="windowText" lastClr="000000"/>
+                    </a:solidFill>
+                  </a:ln>
+                  <a:solidFill>
+                    <a:schemeClr val="bg1"/>
+                  </a:solidFill>
+                </a:rPr>
+                <a:t>P(10,1)</a:t>
+              </a:r>
+              <a:endParaRPr lang="en-CA" sz="4000" dirty="0">
                 <a:ln>
                   <a:solidFill>
                     <a:sysClr val="windowText" lastClr="000000"/>
@@ -3559,94 +3588,94 @@
                 <a:solidFill>
                   <a:schemeClr val="bg1"/>
                 </a:solidFill>
-              </a:rPr>
-              <a:t>P(10,1)</a:t>
-            </a:r>
-            <a:endParaRPr lang="en-CA" sz="4000" dirty="0">
-              <a:ln>
-                <a:solidFill>
-                  <a:sysClr val="windowText" lastClr="000000"/>
-                </a:solidFill>
-              </a:ln>
+              </a:endParaRPr>
+            </a:p>
+          </p:txBody>
+        </p:sp>
+        <p:sp>
+          <p:nvSpPr>
+            <p:cNvPr id="11" name="Right Arrow 10"/>
+            <p:cNvSpPr/>
+            <p:nvPr/>
+          </p:nvSpPr>
+          <p:spPr>
+            <a:xfrm rot="20427909">
+              <a:off x="5751421" y="4130399"/>
+              <a:ext cx="2364526" cy="254266"/>
+            </a:xfrm>
+            <a:prstGeom prst="rightArrow">
+              <a:avLst/>
+            </a:prstGeom>
+            <a:solidFill>
+              <a:srgbClr val="FFFF00"/>
+            </a:solidFill>
+            <a:ln>
               <a:solidFill>
-                <a:schemeClr val="bg1"/>
+                <a:schemeClr val="tx1"/>
               </a:solidFill>
-            </a:endParaRPr>
-          </a:p>
-        </p:txBody>
-      </p:sp>
-      <p:sp>
-        <p:nvSpPr>
-          <p:cNvPr id="11" name="Right Arrow 10"/>
-          <p:cNvSpPr/>
-          <p:nvPr/>
-        </p:nvSpPr>
-        <p:spPr>
-          <a:xfrm rot="20427909">
-            <a:off x="5751421" y="4130399"/>
-            <a:ext cx="2364526" cy="254266"/>
-          </a:xfrm>
-          <a:prstGeom prst="rightArrow">
-            <a:avLst/>
-          </a:prstGeom>
-          <a:solidFill>
-            <a:srgbClr val="FFFF00"/>
-          </a:solidFill>
-          <a:ln>
-            <a:solidFill>
-              <a:schemeClr val="tx1"/>
-            </a:solidFill>
-          </a:ln>
-        </p:spPr>
-        <p:style>
-          <a:lnRef idx="2">
-            <a:schemeClr val="accent1">
-              <a:shade val="50000"/>
-            </a:schemeClr>
-          </a:lnRef>
-          <a:fillRef idx="1">
-            <a:schemeClr val="accent1"/>
-          </a:fillRef>
-          <a:effectRef idx="0">
-            <a:schemeClr val="accent1"/>
-          </a:effectRef>
-          <a:fontRef idx="minor">
-            <a:schemeClr val="lt1"/>
-          </a:fontRef>
-        </p:style>
-        <p:txBody>
-          <a:bodyPr rtlCol="0" anchor="ctr"/>
-          <a:lstStyle/>
-          <a:p>
-            <a:pPr algn="ctr"/>
-            <a:endParaRPr lang="en-CA"/>
-          </a:p>
-        </p:txBody>
-      </p:sp>
-      <p:sp>
-        <p:nvSpPr>
-          <p:cNvPr id="12" name="TextBox 11"/>
-          <p:cNvSpPr txBox="1"/>
-          <p:nvPr/>
-        </p:nvSpPr>
-        <p:spPr>
-          <a:xfrm>
-            <a:off x="6200852" y="4283471"/>
-            <a:ext cx="2398802" cy="769441"/>
-          </a:xfrm>
-          <a:prstGeom prst="rect">
-            <a:avLst/>
-          </a:prstGeom>
-          <a:noFill/>
-        </p:spPr>
-        <p:txBody>
-          <a:bodyPr wrap="square" rtlCol="0">
-            <a:spAutoFit/>
-          </a:bodyPr>
-          <a:lstStyle/>
-          <a:p>
-            <a:r>
-              <a:rPr lang="en-CA" sz="4400" dirty="0" smtClean="0">
+            </a:ln>
+          </p:spPr>
+          <p:style>
+            <a:lnRef idx="2">
+              <a:schemeClr val="accent1">
+                <a:shade val="50000"/>
+              </a:schemeClr>
+            </a:lnRef>
+            <a:fillRef idx="1">
+              <a:schemeClr val="accent1"/>
+            </a:fillRef>
+            <a:effectRef idx="0">
+              <a:schemeClr val="accent1"/>
+            </a:effectRef>
+            <a:fontRef idx="minor">
+              <a:schemeClr val="lt1"/>
+            </a:fontRef>
+          </p:style>
+          <p:txBody>
+            <a:bodyPr rtlCol="0" anchor="ctr"/>
+            <a:lstStyle/>
+            <a:p>
+              <a:pPr algn="ctr"/>
+              <a:endParaRPr lang="en-CA"/>
+            </a:p>
+          </p:txBody>
+        </p:sp>
+        <p:sp>
+          <p:nvSpPr>
+            <p:cNvPr id="12" name="TextBox 11"/>
+            <p:cNvSpPr txBox="1"/>
+            <p:nvPr/>
+          </p:nvSpPr>
+          <p:spPr>
+            <a:xfrm>
+              <a:off x="6649445" y="4013804"/>
+              <a:ext cx="2398802" cy="769441"/>
+            </a:xfrm>
+            <a:prstGeom prst="rect">
+              <a:avLst/>
+            </a:prstGeom>
+            <a:noFill/>
+          </p:spPr>
+          <p:txBody>
+            <a:bodyPr wrap="square" rtlCol="0">
+              <a:spAutoFit/>
+            </a:bodyPr>
+            <a:lstStyle/>
+            <a:p>
+              <a:r>
+                <a:rPr lang="en-CA" sz="4400" dirty="0" smtClean="0">
+                  <a:ln>
+                    <a:solidFill>
+                      <a:sysClr val="windowText" lastClr="000000"/>
+                    </a:solidFill>
+                  </a:ln>
+                  <a:solidFill>
+                    <a:srgbClr val="FFFF00"/>
+                  </a:solidFill>
+                </a:rPr>
+                <a:t>&lt;RL(9,0)&gt;</a:t>
+              </a:r>
+              <a:endParaRPr lang="en-CA" sz="4400" dirty="0">
                 <a:ln>
                   <a:solidFill>
                     <a:sysClr val="windowText" lastClr="000000"/>
@@ -3655,94 +3684,94 @@
                 <a:solidFill>
                   <a:srgbClr val="FFFF00"/>
                 </a:solidFill>
-              </a:rPr>
-              <a:t>&lt;RL(9,0)&gt;</a:t>
-            </a:r>
-            <a:endParaRPr lang="en-CA" sz="4400" dirty="0">
-              <a:ln>
-                <a:solidFill>
-                  <a:sysClr val="windowText" lastClr="000000"/>
-                </a:solidFill>
-              </a:ln>
+              </a:endParaRPr>
+            </a:p>
+          </p:txBody>
+        </p:sp>
+        <p:sp>
+          <p:nvSpPr>
+            <p:cNvPr id="13" name="Left Arrow 12"/>
+            <p:cNvSpPr/>
+            <p:nvPr/>
+          </p:nvSpPr>
+          <p:spPr>
+            <a:xfrm rot="2590347">
+              <a:off x="4771096" y="4081303"/>
+              <a:ext cx="1222387" cy="298135"/>
+            </a:xfrm>
+            <a:prstGeom prst="leftArrow">
+              <a:avLst/>
+            </a:prstGeom>
+            <a:solidFill>
+              <a:srgbClr val="00B050"/>
+            </a:solidFill>
+            <a:ln>
               <a:solidFill>
-                <a:srgbClr val="FFFF00"/>
+                <a:schemeClr val="tx1"/>
               </a:solidFill>
-            </a:endParaRPr>
-          </a:p>
-        </p:txBody>
-      </p:sp>
-      <p:sp>
-        <p:nvSpPr>
-          <p:cNvPr id="13" name="Left Arrow 12"/>
-          <p:cNvSpPr/>
-          <p:nvPr/>
-        </p:nvSpPr>
-        <p:spPr>
-          <a:xfrm rot="2590347">
-            <a:off x="4771096" y="4081303"/>
-            <a:ext cx="1222387" cy="298135"/>
-          </a:xfrm>
-          <a:prstGeom prst="leftArrow">
-            <a:avLst/>
-          </a:prstGeom>
-          <a:solidFill>
-            <a:srgbClr val="00B050"/>
-          </a:solidFill>
-          <a:ln>
-            <a:solidFill>
-              <a:schemeClr val="tx1"/>
-            </a:solidFill>
-          </a:ln>
-        </p:spPr>
-        <p:style>
-          <a:lnRef idx="2">
-            <a:schemeClr val="accent6">
-              <a:shade val="50000"/>
-            </a:schemeClr>
-          </a:lnRef>
-          <a:fillRef idx="1">
-            <a:schemeClr val="accent6"/>
-          </a:fillRef>
-          <a:effectRef idx="0">
-            <a:schemeClr val="accent6"/>
-          </a:effectRef>
-          <a:fontRef idx="minor">
-            <a:schemeClr val="lt1"/>
-          </a:fontRef>
-        </p:style>
-        <p:txBody>
-          <a:bodyPr rtlCol="0" anchor="ctr"/>
-          <a:lstStyle/>
-          <a:p>
-            <a:pPr algn="ctr"/>
-            <a:endParaRPr lang="en-CA"/>
-          </a:p>
-        </p:txBody>
-      </p:sp>
-      <p:sp>
-        <p:nvSpPr>
-          <p:cNvPr id="14" name="TextBox 13"/>
-          <p:cNvSpPr txBox="1"/>
-          <p:nvPr/>
-        </p:nvSpPr>
-        <p:spPr>
-          <a:xfrm>
-            <a:off x="3229232" y="4116859"/>
-            <a:ext cx="2438477" cy="769441"/>
-          </a:xfrm>
-          <a:prstGeom prst="rect">
-            <a:avLst/>
-          </a:prstGeom>
-          <a:noFill/>
-        </p:spPr>
-        <p:txBody>
-          <a:bodyPr wrap="square" rtlCol="0">
-            <a:spAutoFit/>
-          </a:bodyPr>
-          <a:lstStyle/>
-          <a:p>
-            <a:r>
-              <a:rPr lang="en-CA" sz="4400" dirty="0" smtClean="0">
+            </a:ln>
+          </p:spPr>
+          <p:style>
+            <a:lnRef idx="2">
+              <a:schemeClr val="accent6">
+                <a:shade val="50000"/>
+              </a:schemeClr>
+            </a:lnRef>
+            <a:fillRef idx="1">
+              <a:schemeClr val="accent6"/>
+            </a:fillRef>
+            <a:effectRef idx="0">
+              <a:schemeClr val="accent6"/>
+            </a:effectRef>
+            <a:fontRef idx="minor">
+              <a:schemeClr val="lt1"/>
+            </a:fontRef>
+          </p:style>
+          <p:txBody>
+            <a:bodyPr rtlCol="0" anchor="ctr"/>
+            <a:lstStyle/>
+            <a:p>
+              <a:pPr algn="ctr"/>
+              <a:endParaRPr lang="en-CA"/>
+            </a:p>
+          </p:txBody>
+        </p:sp>
+        <p:sp>
+          <p:nvSpPr>
+            <p:cNvPr id="14" name="TextBox 13"/>
+            <p:cNvSpPr txBox="1"/>
+            <p:nvPr/>
+          </p:nvSpPr>
+          <p:spPr>
+            <a:xfrm>
+              <a:off x="3180553" y="3788124"/>
+              <a:ext cx="2438477" cy="769441"/>
+            </a:xfrm>
+            <a:prstGeom prst="rect">
+              <a:avLst/>
+            </a:prstGeom>
+            <a:noFill/>
+          </p:spPr>
+          <p:txBody>
+            <a:bodyPr wrap="square" rtlCol="0">
+              <a:spAutoFit/>
+            </a:bodyPr>
+            <a:lstStyle/>
+            <a:p>
+              <a:r>
+                <a:rPr lang="en-CA" sz="4400" dirty="0" smtClean="0">
+                  <a:ln>
+                    <a:solidFill>
+                      <a:sysClr val="windowText" lastClr="000000"/>
+                    </a:solidFill>
+                  </a:ln>
+                  <a:solidFill>
+                    <a:srgbClr val="00B050"/>
+                  </a:solidFill>
+                </a:rPr>
+                <a:t>&lt;AP(9,0)&gt;</a:t>
+              </a:r>
+              <a:endParaRPr lang="en-CA" sz="4400" dirty="0">
                 <a:ln>
                   <a:solidFill>
                     <a:sysClr val="windowText" lastClr="000000"/>
@@ -3751,22 +3780,443 @@
                 <a:solidFill>
                   <a:srgbClr val="00B050"/>
                 </a:solidFill>
-              </a:rPr>
-              <a:t>&lt;AP(9,0)&gt;</a:t>
-            </a:r>
-            <a:endParaRPr lang="en-CA" sz="4400" dirty="0">
-              <a:ln>
+              </a:endParaRPr>
+            </a:p>
+          </p:txBody>
+        </p:sp>
+        <p:sp>
+          <p:nvSpPr>
+            <p:cNvPr id="15" name="TextBox 14" hidden="1"/>
+            <p:cNvSpPr txBox="1"/>
+            <p:nvPr/>
+          </p:nvSpPr>
+          <p:spPr>
+            <a:xfrm>
+              <a:off x="5533252" y="866813"/>
+              <a:ext cx="1400432" cy="707886"/>
+            </a:xfrm>
+            <a:prstGeom prst="rect">
+              <a:avLst/>
+            </a:prstGeom>
+            <a:noFill/>
+          </p:spPr>
+          <p:txBody>
+            <a:bodyPr wrap="square" rtlCol="0">
+              <a:spAutoFit/>
+            </a:bodyPr>
+            <a:lstStyle/>
+            <a:p>
+              <a:r>
+                <a:rPr lang="en-CA" sz="4000" dirty="0" smtClean="0">
+                  <a:ln>
+                    <a:solidFill>
+                      <a:sysClr val="windowText" lastClr="000000"/>
+                    </a:solidFill>
+                  </a:ln>
+                  <a:solidFill>
+                    <a:schemeClr val="bg1"/>
+                  </a:solidFill>
+                </a:rPr>
+                <a:t>P(7,0)</a:t>
+              </a:r>
+              <a:endParaRPr lang="en-CA" sz="4000" dirty="0">
+                <a:ln>
+                  <a:solidFill>
+                    <a:sysClr val="windowText" lastClr="000000"/>
+                  </a:solidFill>
+                </a:ln>
                 <a:solidFill>
-                  <a:sysClr val="windowText" lastClr="000000"/>
+                  <a:schemeClr val="bg1"/>
                 </a:solidFill>
-              </a:ln>
-              <a:solidFill>
-                <a:srgbClr val="00B050"/>
-              </a:solidFill>
-            </a:endParaRPr>
-          </a:p>
-        </p:txBody>
-      </p:sp>
+              </a:endParaRPr>
+            </a:p>
+          </p:txBody>
+        </p:sp>
+        <p:sp>
+          <p:nvSpPr>
+            <p:cNvPr id="16" name="TextBox 15"/>
+            <p:cNvSpPr txBox="1"/>
+            <p:nvPr/>
+          </p:nvSpPr>
+          <p:spPr>
+            <a:xfrm>
+              <a:off x="5317067" y="2511438"/>
+              <a:ext cx="1400432" cy="707886"/>
+            </a:xfrm>
+            <a:prstGeom prst="rect">
+              <a:avLst/>
+            </a:prstGeom>
+            <a:noFill/>
+          </p:spPr>
+          <p:txBody>
+            <a:bodyPr wrap="square" rtlCol="0">
+              <a:spAutoFit/>
+            </a:bodyPr>
+            <a:lstStyle/>
+            <a:p>
+              <a:r>
+                <a:rPr lang="en-CA" sz="4000" dirty="0" smtClean="0">
+                  <a:ln>
+                    <a:solidFill>
+                      <a:sysClr val="windowText" lastClr="000000"/>
+                    </a:solidFill>
+                  </a:ln>
+                  <a:solidFill>
+                    <a:schemeClr val="bg1"/>
+                  </a:solidFill>
+                </a:rPr>
+                <a:t>P(8,0)</a:t>
+              </a:r>
+              <a:endParaRPr lang="en-CA" sz="4000" dirty="0">
+                <a:ln>
+                  <a:solidFill>
+                    <a:sysClr val="windowText" lastClr="000000"/>
+                  </a:solidFill>
+                </a:ln>
+                <a:solidFill>
+                  <a:schemeClr val="bg1"/>
+                </a:solidFill>
+              </a:endParaRPr>
+            </a:p>
+          </p:txBody>
+        </p:sp>
+        <p:sp>
+          <p:nvSpPr>
+            <p:cNvPr id="18" name="TextBox 17" hidden="1"/>
+            <p:cNvSpPr txBox="1"/>
+            <p:nvPr/>
+          </p:nvSpPr>
+          <p:spPr>
+            <a:xfrm>
+              <a:off x="4100356" y="537387"/>
+              <a:ext cx="1651536" cy="707886"/>
+            </a:xfrm>
+            <a:prstGeom prst="rect">
+              <a:avLst/>
+            </a:prstGeom>
+            <a:noFill/>
+          </p:spPr>
+          <p:txBody>
+            <a:bodyPr wrap="square" rtlCol="0">
+              <a:spAutoFit/>
+            </a:bodyPr>
+            <a:lstStyle/>
+            <a:p>
+              <a:r>
+                <a:rPr lang="en-CA" sz="4000" dirty="0" smtClean="0">
+                  <a:ln>
+                    <a:solidFill>
+                      <a:sysClr val="windowText" lastClr="000000"/>
+                    </a:solidFill>
+                  </a:ln>
+                  <a:solidFill>
+                    <a:schemeClr val="bg1"/>
+                  </a:solidFill>
+                </a:rPr>
+                <a:t>P*(7,0)</a:t>
+              </a:r>
+              <a:endParaRPr lang="en-CA" sz="4000" dirty="0">
+                <a:ln>
+                  <a:solidFill>
+                    <a:sysClr val="windowText" lastClr="000000"/>
+                  </a:solidFill>
+                </a:ln>
+                <a:solidFill>
+                  <a:schemeClr val="bg1"/>
+                </a:solidFill>
+              </a:endParaRPr>
+            </a:p>
+          </p:txBody>
+        </p:sp>
+        <p:sp>
+          <p:nvSpPr>
+            <p:cNvPr id="19" name="TextBox 18" hidden="1"/>
+            <p:cNvSpPr txBox="1"/>
+            <p:nvPr/>
+          </p:nvSpPr>
+          <p:spPr>
+            <a:xfrm>
+              <a:off x="4240399" y="1836683"/>
+              <a:ext cx="1651536" cy="707886"/>
+            </a:xfrm>
+            <a:prstGeom prst="rect">
+              <a:avLst/>
+            </a:prstGeom>
+            <a:noFill/>
+          </p:spPr>
+          <p:txBody>
+            <a:bodyPr wrap="square" rtlCol="0">
+              <a:spAutoFit/>
+            </a:bodyPr>
+            <a:lstStyle/>
+            <a:p>
+              <a:r>
+                <a:rPr lang="en-CA" sz="4000" dirty="0" smtClean="0">
+                  <a:ln>
+                    <a:solidFill>
+                      <a:sysClr val="windowText" lastClr="000000"/>
+                    </a:solidFill>
+                  </a:ln>
+                  <a:solidFill>
+                    <a:schemeClr val="bg1"/>
+                  </a:solidFill>
+                </a:rPr>
+                <a:t>P*(8,0)</a:t>
+              </a:r>
+              <a:endParaRPr lang="en-CA" sz="4000" dirty="0">
+                <a:ln>
+                  <a:solidFill>
+                    <a:sysClr val="windowText" lastClr="000000"/>
+                  </a:solidFill>
+                </a:ln>
+                <a:solidFill>
+                  <a:schemeClr val="bg1"/>
+                </a:solidFill>
+              </a:endParaRPr>
+            </a:p>
+          </p:txBody>
+        </p:sp>
+        <p:sp>
+          <p:nvSpPr>
+            <p:cNvPr id="20" name="TextBox 19"/>
+            <p:cNvSpPr txBox="1"/>
+            <p:nvPr/>
+          </p:nvSpPr>
+          <p:spPr>
+            <a:xfrm>
+              <a:off x="4153623" y="3114185"/>
+              <a:ext cx="1651536" cy="707886"/>
+            </a:xfrm>
+            <a:prstGeom prst="rect">
+              <a:avLst/>
+            </a:prstGeom>
+            <a:noFill/>
+          </p:spPr>
+          <p:txBody>
+            <a:bodyPr wrap="square" rtlCol="0">
+              <a:spAutoFit/>
+            </a:bodyPr>
+            <a:lstStyle/>
+            <a:p>
+              <a:r>
+                <a:rPr lang="en-CA" sz="4000" dirty="0" smtClean="0">
+                  <a:ln>
+                    <a:solidFill>
+                      <a:sysClr val="windowText" lastClr="000000"/>
+                    </a:solidFill>
+                  </a:ln>
+                  <a:solidFill>
+                    <a:schemeClr val="bg1"/>
+                  </a:solidFill>
+                </a:rPr>
+                <a:t>P*(9,0)</a:t>
+              </a:r>
+              <a:endParaRPr lang="en-CA" sz="4000" dirty="0">
+                <a:ln>
+                  <a:solidFill>
+                    <a:sysClr val="windowText" lastClr="000000"/>
+                  </a:solidFill>
+                </a:ln>
+                <a:solidFill>
+                  <a:schemeClr val="bg1"/>
+                </a:solidFill>
+              </a:endParaRPr>
+            </a:p>
+          </p:txBody>
+        </p:sp>
+        <p:sp>
+          <p:nvSpPr>
+            <p:cNvPr id="21" name="TextBox 20"/>
+            <p:cNvSpPr txBox="1"/>
+            <p:nvPr/>
+          </p:nvSpPr>
+          <p:spPr>
+            <a:xfrm>
+              <a:off x="5191719" y="5248606"/>
+              <a:ext cx="1708894" cy="707886"/>
+            </a:xfrm>
+            <a:prstGeom prst="rect">
+              <a:avLst/>
+            </a:prstGeom>
+            <a:noFill/>
+          </p:spPr>
+          <p:txBody>
+            <a:bodyPr wrap="square" rtlCol="0">
+              <a:spAutoFit/>
+            </a:bodyPr>
+            <a:lstStyle/>
+            <a:p>
+              <a:r>
+                <a:rPr lang="en-CA" sz="4000" dirty="0" smtClean="0">
+                  <a:ln>
+                    <a:solidFill>
+                      <a:sysClr val="windowText" lastClr="000000"/>
+                    </a:solidFill>
+                  </a:ln>
+                  <a:solidFill>
+                    <a:schemeClr val="bg1"/>
+                  </a:solidFill>
+                </a:rPr>
+                <a:t>P(10,0)</a:t>
+              </a:r>
+              <a:endParaRPr lang="en-CA" sz="4000" dirty="0">
+                <a:ln>
+                  <a:solidFill>
+                    <a:sysClr val="windowText" lastClr="000000"/>
+                  </a:solidFill>
+                </a:ln>
+                <a:solidFill>
+                  <a:schemeClr val="bg1"/>
+                </a:solidFill>
+              </a:endParaRPr>
+            </a:p>
+          </p:txBody>
+        </p:sp>
+        <p:sp>
+          <p:nvSpPr>
+            <p:cNvPr id="22" name="TextBox 21" hidden="1"/>
+            <p:cNvSpPr txBox="1"/>
+            <p:nvPr/>
+          </p:nvSpPr>
+          <p:spPr>
+            <a:xfrm>
+              <a:off x="6454346" y="5669727"/>
+              <a:ext cx="1708894" cy="707886"/>
+            </a:xfrm>
+            <a:prstGeom prst="rect">
+              <a:avLst/>
+            </a:prstGeom>
+            <a:noFill/>
+          </p:spPr>
+          <p:txBody>
+            <a:bodyPr wrap="square" rtlCol="0">
+              <a:spAutoFit/>
+            </a:bodyPr>
+            <a:lstStyle/>
+            <a:p>
+              <a:r>
+                <a:rPr lang="en-CA" sz="4000" dirty="0" smtClean="0">
+                  <a:ln>
+                    <a:solidFill>
+                      <a:sysClr val="windowText" lastClr="000000"/>
+                    </a:solidFill>
+                  </a:ln>
+                  <a:solidFill>
+                    <a:schemeClr val="bg1"/>
+                  </a:solidFill>
+                </a:rPr>
+                <a:t>P(10,1)</a:t>
+              </a:r>
+              <a:endParaRPr lang="en-CA" sz="4000" dirty="0">
+                <a:ln>
+                  <a:solidFill>
+                    <a:sysClr val="windowText" lastClr="000000"/>
+                  </a:solidFill>
+                </a:ln>
+                <a:solidFill>
+                  <a:schemeClr val="bg1"/>
+                </a:solidFill>
+              </a:endParaRPr>
+            </a:p>
+          </p:txBody>
+        </p:sp>
+        <p:sp>
+          <p:nvSpPr>
+            <p:cNvPr id="23" name="TextBox 22" hidden="1"/>
+            <p:cNvSpPr txBox="1"/>
+            <p:nvPr/>
+          </p:nvSpPr>
+          <p:spPr>
+            <a:xfrm>
+              <a:off x="3443412" y="4403319"/>
+              <a:ext cx="1933300" cy="707886"/>
+            </a:xfrm>
+            <a:prstGeom prst="rect">
+              <a:avLst/>
+            </a:prstGeom>
+            <a:noFill/>
+          </p:spPr>
+          <p:txBody>
+            <a:bodyPr wrap="square" rtlCol="0">
+              <a:spAutoFit/>
+            </a:bodyPr>
+            <a:lstStyle/>
+            <a:p>
+              <a:r>
+                <a:rPr lang="en-CA" sz="4000" dirty="0" smtClean="0">
+                  <a:ln>
+                    <a:solidFill>
+                      <a:sysClr val="windowText" lastClr="000000"/>
+                    </a:solidFill>
+                  </a:ln>
+                  <a:solidFill>
+                    <a:schemeClr val="bg1"/>
+                  </a:solidFill>
+                </a:rPr>
+                <a:t>P*(10,0)</a:t>
+              </a:r>
+              <a:endParaRPr lang="en-CA" sz="4000" dirty="0">
+                <a:ln>
+                  <a:solidFill>
+                    <a:sysClr val="windowText" lastClr="000000"/>
+                  </a:solidFill>
+                </a:ln>
+                <a:solidFill>
+                  <a:schemeClr val="bg1"/>
+                </a:solidFill>
+              </a:endParaRPr>
+            </a:p>
+          </p:txBody>
+        </p:sp>
+        <p:sp>
+          <p:nvSpPr>
+            <p:cNvPr id="24" name="TextBox 23" hidden="1"/>
+            <p:cNvSpPr txBox="1"/>
+            <p:nvPr/>
+          </p:nvSpPr>
+          <p:spPr>
+            <a:xfrm>
+              <a:off x="3443412" y="5445464"/>
+              <a:ext cx="1933300" cy="707886"/>
+            </a:xfrm>
+            <a:prstGeom prst="rect">
+              <a:avLst/>
+            </a:prstGeom>
+            <a:noFill/>
+          </p:spPr>
+          <p:txBody>
+            <a:bodyPr wrap="square" rtlCol="0">
+              <a:spAutoFit/>
+            </a:bodyPr>
+            <a:lstStyle/>
+            <a:p>
+              <a:r>
+                <a:rPr lang="en-CA" sz="4000" dirty="0" smtClean="0">
+                  <a:ln>
+                    <a:solidFill>
+                      <a:sysClr val="windowText" lastClr="000000"/>
+                    </a:solidFill>
+                  </a:ln>
+                  <a:solidFill>
+                    <a:schemeClr val="bg1"/>
+                  </a:solidFill>
+                </a:rPr>
+                <a:t>P*(11,0)</a:t>
+              </a:r>
+              <a:endParaRPr lang="en-CA" sz="4000" dirty="0">
+                <a:ln>
+                  <a:solidFill>
+                    <a:sysClr val="windowText" lastClr="000000"/>
+                  </a:solidFill>
+                </a:ln>
+                <a:solidFill>
+                  <a:schemeClr val="bg1"/>
+                </a:solidFill>
+              </a:endParaRPr>
+            </a:p>
+          </p:txBody>
+        </p:sp>
+      </p:grpSp>
     </p:spTree>
     <p:extLst>
       <p:ext uri="{BB962C8B-B14F-4D97-AF65-F5344CB8AC3E}">
@@ -3797,15 +4247,1871 @@
           <a:chExt cx="0" cy="0"/>
         </a:xfrm>
       </p:grpSpPr>
+      <p:grpSp>
+        <p:nvGrpSpPr>
+          <p:cNvPr id="27" name="Group 26"/>
+          <p:cNvGrpSpPr/>
+          <p:nvPr/>
+        </p:nvGrpSpPr>
+        <p:grpSpPr>
+          <a:xfrm>
+            <a:off x="1889055" y="0"/>
+            <a:ext cx="8413890" cy="6965061"/>
+            <a:chOff x="1889055" y="0"/>
+            <a:chExt cx="8413890" cy="6965061"/>
+          </a:xfrm>
+        </p:grpSpPr>
+        <p:pic>
+          <p:nvPicPr>
+            <p:cNvPr id="2" name="Picture 1"/>
+            <p:cNvPicPr>
+              <a:picLocks noChangeAspect="1"/>
+            </p:cNvPicPr>
+            <p:nvPr/>
+          </p:nvPicPr>
+          <p:blipFill>
+            <a:blip r:embed="rId2">
+              <a:extLst>
+                <a:ext uri="{28A0092B-C50C-407E-A947-70E740481C1C}">
+                  <a14:useLocalDpi xmlns:a14="http://schemas.microsoft.com/office/drawing/2010/main" val="0"/>
+                </a:ext>
+              </a:extLst>
+            </a:blip>
+            <a:stretch>
+              <a:fillRect/>
+            </a:stretch>
+          </p:blipFill>
+          <p:spPr>
+            <a:xfrm>
+              <a:off x="1889055" y="0"/>
+              <a:ext cx="8413890" cy="6858000"/>
+            </a:xfrm>
+            <a:prstGeom prst="rect">
+              <a:avLst/>
+            </a:prstGeom>
+          </p:spPr>
+        </p:pic>
+        <p:sp>
+          <p:nvSpPr>
+            <p:cNvPr id="11" name="Left Arrow 10"/>
+            <p:cNvSpPr/>
+            <p:nvPr/>
+          </p:nvSpPr>
+          <p:spPr>
+            <a:xfrm rot="7833931">
+              <a:off x="5254286" y="3685889"/>
+              <a:ext cx="876846" cy="298135"/>
+            </a:xfrm>
+            <a:prstGeom prst="leftArrow">
+              <a:avLst/>
+            </a:prstGeom>
+            <a:solidFill>
+              <a:srgbClr val="00B050"/>
+            </a:solidFill>
+            <a:ln>
+              <a:solidFill>
+                <a:schemeClr val="tx1"/>
+              </a:solidFill>
+            </a:ln>
+          </p:spPr>
+          <p:style>
+            <a:lnRef idx="2">
+              <a:schemeClr val="accent6">
+                <a:shade val="50000"/>
+              </a:schemeClr>
+            </a:lnRef>
+            <a:fillRef idx="1">
+              <a:schemeClr val="accent6"/>
+            </a:fillRef>
+            <a:effectRef idx="0">
+              <a:schemeClr val="accent6"/>
+            </a:effectRef>
+            <a:fontRef idx="minor">
+              <a:schemeClr val="lt1"/>
+            </a:fontRef>
+          </p:style>
+          <p:txBody>
+            <a:bodyPr rtlCol="0" anchor="ctr"/>
+            <a:lstStyle/>
+            <a:p>
+              <a:pPr algn="ctr"/>
+              <a:endParaRPr lang="en-CA"/>
+            </a:p>
+          </p:txBody>
+        </p:sp>
+        <p:sp>
+          <p:nvSpPr>
+            <p:cNvPr id="3" name="TextBox 2" hidden="1"/>
+            <p:cNvSpPr txBox="1"/>
+            <p:nvPr/>
+          </p:nvSpPr>
+          <p:spPr>
+            <a:xfrm>
+              <a:off x="4487046" y="586726"/>
+              <a:ext cx="1400432" cy="707886"/>
+            </a:xfrm>
+            <a:prstGeom prst="rect">
+              <a:avLst/>
+            </a:prstGeom>
+            <a:noFill/>
+          </p:spPr>
+          <p:txBody>
+            <a:bodyPr wrap="square" rtlCol="0">
+              <a:spAutoFit/>
+            </a:bodyPr>
+            <a:lstStyle/>
+            <a:p>
+              <a:r>
+                <a:rPr lang="en-CA" sz="4000" dirty="0" smtClean="0">
+                  <a:ln>
+                    <a:solidFill>
+                      <a:sysClr val="windowText" lastClr="000000"/>
+                    </a:solidFill>
+                  </a:ln>
+                  <a:solidFill>
+                    <a:schemeClr val="bg1"/>
+                  </a:solidFill>
+                </a:rPr>
+                <a:t>P(7,0)</a:t>
+              </a:r>
+              <a:endParaRPr lang="en-CA" sz="4000" dirty="0">
+                <a:ln>
+                  <a:solidFill>
+                    <a:sysClr val="windowText" lastClr="000000"/>
+                  </a:solidFill>
+                </a:ln>
+                <a:solidFill>
+                  <a:schemeClr val="bg1"/>
+                </a:solidFill>
+              </a:endParaRPr>
+            </a:p>
+          </p:txBody>
+        </p:sp>
+        <p:sp>
+          <p:nvSpPr>
+            <p:cNvPr id="4" name="TextBox 3" hidden="1"/>
+            <p:cNvSpPr txBox="1"/>
+            <p:nvPr/>
+          </p:nvSpPr>
+          <p:spPr>
+            <a:xfrm>
+              <a:off x="5206313" y="162478"/>
+              <a:ext cx="1746421" cy="707886"/>
+            </a:xfrm>
+            <a:prstGeom prst="rect">
+              <a:avLst/>
+            </a:prstGeom>
+            <a:noFill/>
+          </p:spPr>
+          <p:txBody>
+            <a:bodyPr wrap="square" rtlCol="0">
+              <a:spAutoFit/>
+            </a:bodyPr>
+            <a:lstStyle/>
+            <a:p>
+              <a:r>
+                <a:rPr lang="en-CA" sz="4000" dirty="0" smtClean="0">
+                  <a:ln>
+                    <a:solidFill>
+                      <a:sysClr val="windowText" lastClr="000000"/>
+                    </a:solidFill>
+                  </a:ln>
+                  <a:solidFill>
+                    <a:schemeClr val="bg1"/>
+                  </a:solidFill>
+                </a:rPr>
+                <a:t>P*(7,0)</a:t>
+              </a:r>
+              <a:endParaRPr lang="en-CA" sz="4000" dirty="0">
+                <a:ln>
+                  <a:solidFill>
+                    <a:sysClr val="windowText" lastClr="000000"/>
+                  </a:solidFill>
+                </a:ln>
+                <a:solidFill>
+                  <a:schemeClr val="bg1"/>
+                </a:solidFill>
+              </a:endParaRPr>
+            </a:p>
+          </p:txBody>
+        </p:sp>
+        <p:sp>
+          <p:nvSpPr>
+            <p:cNvPr id="6" name="Up Arrow 5"/>
+            <p:cNvSpPr/>
+            <p:nvPr/>
+          </p:nvSpPr>
+          <p:spPr>
+            <a:xfrm>
+              <a:off x="5244926" y="2662881"/>
+              <a:ext cx="263610" cy="1532238"/>
+            </a:xfrm>
+            <a:prstGeom prst="upArrow">
+              <a:avLst/>
+            </a:prstGeom>
+            <a:ln>
+              <a:solidFill>
+                <a:schemeClr val="tx1"/>
+              </a:solidFill>
+            </a:ln>
+          </p:spPr>
+          <p:style>
+            <a:lnRef idx="2">
+              <a:schemeClr val="accent5">
+                <a:shade val="50000"/>
+              </a:schemeClr>
+            </a:lnRef>
+            <a:fillRef idx="1">
+              <a:schemeClr val="accent5"/>
+            </a:fillRef>
+            <a:effectRef idx="0">
+              <a:schemeClr val="accent5"/>
+            </a:effectRef>
+            <a:fontRef idx="minor">
+              <a:schemeClr val="lt1"/>
+            </a:fontRef>
+          </p:style>
+          <p:txBody>
+            <a:bodyPr rtlCol="0" anchor="ctr"/>
+            <a:lstStyle/>
+            <a:p>
+              <a:pPr algn="ctr"/>
+              <a:endParaRPr lang="en-CA"/>
+            </a:p>
+          </p:txBody>
+        </p:sp>
+        <p:sp>
+          <p:nvSpPr>
+            <p:cNvPr id="5" name="TextBox 4"/>
+            <p:cNvSpPr txBox="1"/>
+            <p:nvPr/>
+          </p:nvSpPr>
+          <p:spPr>
+            <a:xfrm>
+              <a:off x="5294353" y="2467276"/>
+              <a:ext cx="2207741" cy="769441"/>
+            </a:xfrm>
+            <a:prstGeom prst="rect">
+              <a:avLst/>
+            </a:prstGeom>
+            <a:noFill/>
+          </p:spPr>
+          <p:txBody>
+            <a:bodyPr wrap="square" rtlCol="0">
+              <a:spAutoFit/>
+            </a:bodyPr>
+            <a:lstStyle/>
+            <a:p>
+              <a:r>
+                <a:rPr lang="en-CA" sz="4400" dirty="0" smtClean="0">
+                  <a:ln>
+                    <a:solidFill>
+                      <a:sysClr val="windowText" lastClr="000000"/>
+                    </a:solidFill>
+                  </a:ln>
+                  <a:solidFill>
+                    <a:schemeClr val="accent5"/>
+                  </a:solidFill>
+                </a:rPr>
+                <a:t>&lt;SI(9,0)&gt;</a:t>
+              </a:r>
+              <a:endParaRPr lang="en-CA" sz="4400" dirty="0">
+                <a:ln>
+                  <a:solidFill>
+                    <a:sysClr val="windowText" lastClr="000000"/>
+                  </a:solidFill>
+                </a:ln>
+                <a:solidFill>
+                  <a:schemeClr val="accent5"/>
+                </a:solidFill>
+              </a:endParaRPr>
+            </a:p>
+          </p:txBody>
+        </p:sp>
+        <p:sp>
+          <p:nvSpPr>
+            <p:cNvPr id="7" name="Right Arrow 6"/>
+            <p:cNvSpPr/>
+            <p:nvPr/>
+          </p:nvSpPr>
+          <p:spPr>
+            <a:xfrm rot="750773">
+              <a:off x="5290574" y="4385150"/>
+              <a:ext cx="2922700" cy="285519"/>
+            </a:xfrm>
+            <a:prstGeom prst="rightArrow">
+              <a:avLst/>
+            </a:prstGeom>
+            <a:solidFill>
+              <a:srgbClr val="FFFF00"/>
+            </a:solidFill>
+            <a:ln>
+              <a:solidFill>
+                <a:schemeClr val="tx1"/>
+              </a:solidFill>
+            </a:ln>
+          </p:spPr>
+          <p:style>
+            <a:lnRef idx="2">
+              <a:schemeClr val="accent1">
+                <a:shade val="50000"/>
+              </a:schemeClr>
+            </a:lnRef>
+            <a:fillRef idx="1">
+              <a:schemeClr val="accent1"/>
+            </a:fillRef>
+            <a:effectRef idx="0">
+              <a:schemeClr val="accent1"/>
+            </a:effectRef>
+            <a:fontRef idx="minor">
+              <a:schemeClr val="lt1"/>
+            </a:fontRef>
+          </p:style>
+          <p:txBody>
+            <a:bodyPr rtlCol="0" anchor="ctr"/>
+            <a:lstStyle/>
+            <a:p>
+              <a:pPr algn="ctr"/>
+              <a:endParaRPr lang="en-CA"/>
+            </a:p>
+          </p:txBody>
+        </p:sp>
+        <p:sp>
+          <p:nvSpPr>
+            <p:cNvPr id="8" name="TextBox 7"/>
+            <p:cNvSpPr txBox="1"/>
+            <p:nvPr/>
+          </p:nvSpPr>
+          <p:spPr>
+            <a:xfrm>
+              <a:off x="5407209" y="4467661"/>
+              <a:ext cx="2398802" cy="769441"/>
+            </a:xfrm>
+            <a:prstGeom prst="rect">
+              <a:avLst/>
+            </a:prstGeom>
+            <a:noFill/>
+          </p:spPr>
+          <p:txBody>
+            <a:bodyPr wrap="square" rtlCol="0">
+              <a:spAutoFit/>
+            </a:bodyPr>
+            <a:lstStyle/>
+            <a:p>
+              <a:r>
+                <a:rPr lang="en-CA" sz="4400" dirty="0" smtClean="0">
+                  <a:ln>
+                    <a:solidFill>
+                      <a:sysClr val="windowText" lastClr="000000"/>
+                    </a:solidFill>
+                  </a:ln>
+                  <a:solidFill>
+                    <a:srgbClr val="FFFF00"/>
+                  </a:solidFill>
+                </a:rPr>
+                <a:t>&lt;RL(9,0)&gt;</a:t>
+              </a:r>
+              <a:endParaRPr lang="en-CA" sz="4400" dirty="0">
+                <a:ln>
+                  <a:solidFill>
+                    <a:sysClr val="windowText" lastClr="000000"/>
+                  </a:solidFill>
+                </a:ln>
+                <a:solidFill>
+                  <a:srgbClr val="FFFF00"/>
+                </a:solidFill>
+              </a:endParaRPr>
+            </a:p>
+          </p:txBody>
+        </p:sp>
+        <p:sp>
+          <p:nvSpPr>
+            <p:cNvPr id="9" name="TextBox 8" hidden="1"/>
+            <p:cNvSpPr txBox="1"/>
+            <p:nvPr/>
+          </p:nvSpPr>
+          <p:spPr>
+            <a:xfrm>
+              <a:off x="5100388" y="1556954"/>
+              <a:ext cx="1651536" cy="707886"/>
+            </a:xfrm>
+            <a:prstGeom prst="rect">
+              <a:avLst/>
+            </a:prstGeom>
+            <a:noFill/>
+          </p:spPr>
+          <p:txBody>
+            <a:bodyPr wrap="square" rtlCol="0">
+              <a:spAutoFit/>
+            </a:bodyPr>
+            <a:lstStyle/>
+            <a:p>
+              <a:r>
+                <a:rPr lang="en-CA" sz="4000" dirty="0" smtClean="0">
+                  <a:ln>
+                    <a:solidFill>
+                      <a:sysClr val="windowText" lastClr="000000"/>
+                    </a:solidFill>
+                  </a:ln>
+                  <a:solidFill>
+                    <a:schemeClr val="bg1"/>
+                  </a:solidFill>
+                </a:rPr>
+                <a:t>P*(8,0)</a:t>
+              </a:r>
+              <a:endParaRPr lang="en-CA" sz="4000" dirty="0">
+                <a:ln>
+                  <a:solidFill>
+                    <a:sysClr val="windowText" lastClr="000000"/>
+                  </a:solidFill>
+                </a:ln>
+                <a:solidFill>
+                  <a:schemeClr val="bg1"/>
+                </a:solidFill>
+              </a:endParaRPr>
+            </a:p>
+          </p:txBody>
+        </p:sp>
+        <p:sp>
+          <p:nvSpPr>
+            <p:cNvPr id="10" name="TextBox 9"/>
+            <p:cNvSpPr txBox="1"/>
+            <p:nvPr/>
+          </p:nvSpPr>
+          <p:spPr>
+            <a:xfrm>
+              <a:off x="4525724" y="2109918"/>
+              <a:ext cx="1400432" cy="707886"/>
+            </a:xfrm>
+            <a:prstGeom prst="rect">
+              <a:avLst/>
+            </a:prstGeom>
+            <a:noFill/>
+          </p:spPr>
+          <p:txBody>
+            <a:bodyPr wrap="square" rtlCol="0">
+              <a:spAutoFit/>
+            </a:bodyPr>
+            <a:lstStyle/>
+            <a:p>
+              <a:r>
+                <a:rPr lang="en-CA" sz="4000" dirty="0" smtClean="0">
+                  <a:ln>
+                    <a:solidFill>
+                      <a:sysClr val="windowText" lastClr="000000"/>
+                    </a:solidFill>
+                  </a:ln>
+                  <a:solidFill>
+                    <a:schemeClr val="bg1"/>
+                  </a:solidFill>
+                </a:rPr>
+                <a:t>P(8,0)</a:t>
+              </a:r>
+              <a:endParaRPr lang="en-CA" sz="4000" dirty="0">
+                <a:ln>
+                  <a:solidFill>
+                    <a:sysClr val="windowText" lastClr="000000"/>
+                  </a:solidFill>
+                </a:ln>
+                <a:solidFill>
+                  <a:schemeClr val="bg1"/>
+                </a:solidFill>
+              </a:endParaRPr>
+            </a:p>
+          </p:txBody>
+        </p:sp>
+        <p:sp>
+          <p:nvSpPr>
+            <p:cNvPr id="12" name="TextBox 11"/>
+            <p:cNvSpPr txBox="1"/>
+            <p:nvPr/>
+          </p:nvSpPr>
+          <p:spPr>
+            <a:xfrm>
+              <a:off x="5887478" y="3055057"/>
+              <a:ext cx="1651536" cy="707886"/>
+            </a:xfrm>
+            <a:prstGeom prst="rect">
+              <a:avLst/>
+            </a:prstGeom>
+            <a:noFill/>
+          </p:spPr>
+          <p:txBody>
+            <a:bodyPr wrap="square" rtlCol="0">
+              <a:spAutoFit/>
+            </a:bodyPr>
+            <a:lstStyle/>
+            <a:p>
+              <a:r>
+                <a:rPr lang="en-CA" sz="4000" dirty="0" smtClean="0">
+                  <a:ln>
+                    <a:solidFill>
+                      <a:sysClr val="windowText" lastClr="000000"/>
+                    </a:solidFill>
+                  </a:ln>
+                  <a:solidFill>
+                    <a:schemeClr val="bg1"/>
+                  </a:solidFill>
+                </a:rPr>
+                <a:t>P*(9,0)</a:t>
+              </a:r>
+              <a:endParaRPr lang="en-CA" sz="4000" dirty="0">
+                <a:ln>
+                  <a:solidFill>
+                    <a:sysClr val="windowText" lastClr="000000"/>
+                  </a:solidFill>
+                </a:ln>
+                <a:solidFill>
+                  <a:schemeClr val="bg1"/>
+                </a:solidFill>
+              </a:endParaRPr>
+            </a:p>
+          </p:txBody>
+        </p:sp>
+        <p:sp>
+          <p:nvSpPr>
+            <p:cNvPr id="13" name="TextBox 12"/>
+            <p:cNvSpPr txBox="1"/>
+            <p:nvPr/>
+          </p:nvSpPr>
+          <p:spPr>
+            <a:xfrm>
+              <a:off x="4297938" y="4186022"/>
+              <a:ext cx="1400432" cy="707886"/>
+            </a:xfrm>
+            <a:prstGeom prst="rect">
+              <a:avLst/>
+            </a:prstGeom>
+            <a:noFill/>
+          </p:spPr>
+          <p:txBody>
+            <a:bodyPr wrap="square" rtlCol="0">
+              <a:spAutoFit/>
+            </a:bodyPr>
+            <a:lstStyle/>
+            <a:p>
+              <a:r>
+                <a:rPr lang="en-CA" sz="4000" dirty="0" smtClean="0">
+                  <a:ln>
+                    <a:solidFill>
+                      <a:sysClr val="windowText" lastClr="000000"/>
+                    </a:solidFill>
+                  </a:ln>
+                  <a:solidFill>
+                    <a:schemeClr val="bg1"/>
+                  </a:solidFill>
+                </a:rPr>
+                <a:t>P(9,0)</a:t>
+              </a:r>
+              <a:endParaRPr lang="en-CA" sz="4000" dirty="0">
+                <a:ln>
+                  <a:solidFill>
+                    <a:sysClr val="windowText" lastClr="000000"/>
+                  </a:solidFill>
+                </a:ln>
+                <a:solidFill>
+                  <a:schemeClr val="bg1"/>
+                </a:solidFill>
+              </a:endParaRPr>
+            </a:p>
+          </p:txBody>
+        </p:sp>
+        <p:sp>
+          <p:nvSpPr>
+            <p:cNvPr id="14" name="TextBox 13"/>
+            <p:cNvSpPr txBox="1"/>
+            <p:nvPr/>
+          </p:nvSpPr>
+          <p:spPr>
+            <a:xfrm>
+              <a:off x="5181878" y="5339420"/>
+              <a:ext cx="1748997" cy="707886"/>
+            </a:xfrm>
+            <a:prstGeom prst="rect">
+              <a:avLst/>
+            </a:prstGeom>
+            <a:noFill/>
+          </p:spPr>
+          <p:txBody>
+            <a:bodyPr wrap="square" rtlCol="0">
+              <a:spAutoFit/>
+            </a:bodyPr>
+            <a:lstStyle/>
+            <a:p>
+              <a:r>
+                <a:rPr lang="en-CA" sz="4000" dirty="0" smtClean="0">
+                  <a:ln>
+                    <a:solidFill>
+                      <a:sysClr val="windowText" lastClr="000000"/>
+                    </a:solidFill>
+                  </a:ln>
+                  <a:solidFill>
+                    <a:schemeClr val="bg1"/>
+                  </a:solidFill>
+                </a:rPr>
+                <a:t>P(10,0)</a:t>
+              </a:r>
+              <a:endParaRPr lang="en-CA" sz="4000" dirty="0">
+                <a:ln>
+                  <a:solidFill>
+                    <a:sysClr val="windowText" lastClr="000000"/>
+                  </a:solidFill>
+                </a:ln>
+                <a:solidFill>
+                  <a:schemeClr val="bg1"/>
+                </a:solidFill>
+              </a:endParaRPr>
+            </a:p>
+          </p:txBody>
+        </p:sp>
+        <p:sp>
+          <p:nvSpPr>
+            <p:cNvPr id="15" name="TextBox 14" hidden="1"/>
+            <p:cNvSpPr txBox="1"/>
+            <p:nvPr/>
+          </p:nvSpPr>
+          <p:spPr>
+            <a:xfrm>
+              <a:off x="4818210" y="6088027"/>
+              <a:ext cx="1748997" cy="707886"/>
+            </a:xfrm>
+            <a:prstGeom prst="rect">
+              <a:avLst/>
+            </a:prstGeom>
+            <a:noFill/>
+          </p:spPr>
+          <p:txBody>
+            <a:bodyPr wrap="square" rtlCol="0">
+              <a:spAutoFit/>
+            </a:bodyPr>
+            <a:lstStyle/>
+            <a:p>
+              <a:r>
+                <a:rPr lang="en-CA" sz="4000" dirty="0" smtClean="0">
+                  <a:ln>
+                    <a:solidFill>
+                      <a:sysClr val="windowText" lastClr="000000"/>
+                    </a:solidFill>
+                  </a:ln>
+                  <a:solidFill>
+                    <a:schemeClr val="bg1"/>
+                  </a:solidFill>
+                </a:rPr>
+                <a:t>P(11,0)</a:t>
+              </a:r>
+              <a:endParaRPr lang="en-CA" sz="4000" dirty="0">
+                <a:ln>
+                  <a:solidFill>
+                    <a:sysClr val="windowText" lastClr="000000"/>
+                  </a:solidFill>
+                </a:ln>
+                <a:solidFill>
+                  <a:schemeClr val="bg1"/>
+                </a:solidFill>
+              </a:endParaRPr>
+            </a:p>
+          </p:txBody>
+        </p:sp>
+        <p:sp>
+          <p:nvSpPr>
+            <p:cNvPr id="16" name="TextBox 15"/>
+            <p:cNvSpPr txBox="1"/>
+            <p:nvPr/>
+          </p:nvSpPr>
+          <p:spPr>
+            <a:xfrm>
+              <a:off x="7703237" y="4173966"/>
+              <a:ext cx="1400432" cy="707886"/>
+            </a:xfrm>
+            <a:prstGeom prst="rect">
+              <a:avLst/>
+            </a:prstGeom>
+            <a:noFill/>
+          </p:spPr>
+          <p:txBody>
+            <a:bodyPr wrap="square" rtlCol="0">
+              <a:spAutoFit/>
+            </a:bodyPr>
+            <a:lstStyle/>
+            <a:p>
+              <a:r>
+                <a:rPr lang="en-CA" sz="4000" dirty="0" smtClean="0">
+                  <a:ln>
+                    <a:solidFill>
+                      <a:sysClr val="windowText" lastClr="000000"/>
+                    </a:solidFill>
+                  </a:ln>
+                  <a:solidFill>
+                    <a:schemeClr val="bg1"/>
+                  </a:solidFill>
+                </a:rPr>
+                <a:t>P(9,1)</a:t>
+              </a:r>
+              <a:endParaRPr lang="en-CA" sz="4000" dirty="0">
+                <a:ln>
+                  <a:solidFill>
+                    <a:sysClr val="windowText" lastClr="000000"/>
+                  </a:solidFill>
+                </a:ln>
+                <a:solidFill>
+                  <a:schemeClr val="bg1"/>
+                </a:solidFill>
+              </a:endParaRPr>
+            </a:p>
+          </p:txBody>
+        </p:sp>
+        <p:sp>
+          <p:nvSpPr>
+            <p:cNvPr id="17" name="TextBox 16"/>
+            <p:cNvSpPr txBox="1"/>
+            <p:nvPr/>
+          </p:nvSpPr>
+          <p:spPr>
+            <a:xfrm>
+              <a:off x="7806011" y="3503410"/>
+              <a:ext cx="1692215" cy="707886"/>
+            </a:xfrm>
+            <a:prstGeom prst="rect">
+              <a:avLst/>
+            </a:prstGeom>
+            <a:noFill/>
+          </p:spPr>
+          <p:txBody>
+            <a:bodyPr wrap="square" rtlCol="0">
+              <a:spAutoFit/>
+            </a:bodyPr>
+            <a:lstStyle/>
+            <a:p>
+              <a:r>
+                <a:rPr lang="en-CA" sz="4000" dirty="0" smtClean="0">
+                  <a:ln>
+                    <a:solidFill>
+                      <a:sysClr val="windowText" lastClr="000000"/>
+                    </a:solidFill>
+                  </a:ln>
+                  <a:solidFill>
+                    <a:schemeClr val="bg1"/>
+                  </a:solidFill>
+                </a:rPr>
+                <a:t>P*(9,1)</a:t>
+              </a:r>
+              <a:endParaRPr lang="en-CA" sz="4000" dirty="0">
+                <a:ln>
+                  <a:solidFill>
+                    <a:sysClr val="windowText" lastClr="000000"/>
+                  </a:solidFill>
+                </a:ln>
+                <a:solidFill>
+                  <a:schemeClr val="bg1"/>
+                </a:solidFill>
+              </a:endParaRPr>
+            </a:p>
+          </p:txBody>
+        </p:sp>
+        <p:sp>
+          <p:nvSpPr>
+            <p:cNvPr id="18" name="TextBox 17" hidden="1"/>
+            <p:cNvSpPr txBox="1"/>
+            <p:nvPr/>
+          </p:nvSpPr>
+          <p:spPr>
+            <a:xfrm>
+              <a:off x="7914894" y="2197819"/>
+              <a:ext cx="1692215" cy="707886"/>
+            </a:xfrm>
+            <a:prstGeom prst="rect">
+              <a:avLst/>
+            </a:prstGeom>
+            <a:noFill/>
+          </p:spPr>
+          <p:txBody>
+            <a:bodyPr wrap="square" rtlCol="0">
+              <a:spAutoFit/>
+            </a:bodyPr>
+            <a:lstStyle/>
+            <a:p>
+              <a:r>
+                <a:rPr lang="en-CA" sz="4000" dirty="0" smtClean="0">
+                  <a:ln>
+                    <a:solidFill>
+                      <a:sysClr val="windowText" lastClr="000000"/>
+                    </a:solidFill>
+                  </a:ln>
+                  <a:solidFill>
+                    <a:schemeClr val="bg1"/>
+                  </a:solidFill>
+                </a:rPr>
+                <a:t>P*(8,1)</a:t>
+              </a:r>
+              <a:endParaRPr lang="en-CA" sz="4000" dirty="0">
+                <a:ln>
+                  <a:solidFill>
+                    <a:sysClr val="windowText" lastClr="000000"/>
+                  </a:solidFill>
+                </a:ln>
+                <a:solidFill>
+                  <a:schemeClr val="bg1"/>
+                </a:solidFill>
+              </a:endParaRPr>
+            </a:p>
+          </p:txBody>
+        </p:sp>
+        <p:sp>
+          <p:nvSpPr>
+            <p:cNvPr id="19" name="TextBox 18" hidden="1"/>
+            <p:cNvSpPr txBox="1"/>
+            <p:nvPr/>
+          </p:nvSpPr>
+          <p:spPr>
+            <a:xfrm>
+              <a:off x="8116721" y="533659"/>
+              <a:ext cx="1692215" cy="707886"/>
+            </a:xfrm>
+            <a:prstGeom prst="rect">
+              <a:avLst/>
+            </a:prstGeom>
+            <a:noFill/>
+          </p:spPr>
+          <p:txBody>
+            <a:bodyPr wrap="square" rtlCol="0">
+              <a:spAutoFit/>
+            </a:bodyPr>
+            <a:lstStyle/>
+            <a:p>
+              <a:r>
+                <a:rPr lang="en-CA" sz="4000" dirty="0" smtClean="0">
+                  <a:ln>
+                    <a:solidFill>
+                      <a:sysClr val="windowText" lastClr="000000"/>
+                    </a:solidFill>
+                  </a:ln>
+                  <a:solidFill>
+                    <a:schemeClr val="bg1"/>
+                  </a:solidFill>
+                </a:rPr>
+                <a:t>P*(7,1)</a:t>
+              </a:r>
+              <a:endParaRPr lang="en-CA" sz="4000" dirty="0">
+                <a:ln>
+                  <a:solidFill>
+                    <a:sysClr val="windowText" lastClr="000000"/>
+                  </a:solidFill>
+                </a:ln>
+                <a:solidFill>
+                  <a:schemeClr val="bg1"/>
+                </a:solidFill>
+              </a:endParaRPr>
+            </a:p>
+          </p:txBody>
+        </p:sp>
+        <p:sp>
+          <p:nvSpPr>
+            <p:cNvPr id="20" name="TextBox 19" hidden="1"/>
+            <p:cNvSpPr txBox="1"/>
+            <p:nvPr/>
+          </p:nvSpPr>
+          <p:spPr>
+            <a:xfrm>
+              <a:off x="7575854" y="5213060"/>
+              <a:ext cx="1978866" cy="707886"/>
+            </a:xfrm>
+            <a:prstGeom prst="rect">
+              <a:avLst/>
+            </a:prstGeom>
+            <a:noFill/>
+          </p:spPr>
+          <p:txBody>
+            <a:bodyPr wrap="square" rtlCol="0">
+              <a:spAutoFit/>
+            </a:bodyPr>
+            <a:lstStyle/>
+            <a:p>
+              <a:r>
+                <a:rPr lang="en-CA" sz="4000" dirty="0" smtClean="0">
+                  <a:ln>
+                    <a:solidFill>
+                      <a:sysClr val="windowText" lastClr="000000"/>
+                    </a:solidFill>
+                  </a:ln>
+                  <a:solidFill>
+                    <a:schemeClr val="bg1"/>
+                  </a:solidFill>
+                </a:rPr>
+                <a:t>P*(10,1)</a:t>
+              </a:r>
+              <a:endParaRPr lang="en-CA" sz="4000" dirty="0">
+                <a:ln>
+                  <a:solidFill>
+                    <a:sysClr val="windowText" lastClr="000000"/>
+                  </a:solidFill>
+                </a:ln>
+                <a:solidFill>
+                  <a:schemeClr val="bg1"/>
+                </a:solidFill>
+              </a:endParaRPr>
+            </a:p>
+          </p:txBody>
+        </p:sp>
+        <p:sp>
+          <p:nvSpPr>
+            <p:cNvPr id="21" name="TextBox 20" hidden="1"/>
+            <p:cNvSpPr txBox="1"/>
+            <p:nvPr/>
+          </p:nvSpPr>
+          <p:spPr>
+            <a:xfrm>
+              <a:off x="6462707" y="5825412"/>
+              <a:ext cx="1978866" cy="707886"/>
+            </a:xfrm>
+            <a:prstGeom prst="rect">
+              <a:avLst/>
+            </a:prstGeom>
+            <a:noFill/>
+          </p:spPr>
+          <p:txBody>
+            <a:bodyPr wrap="square" rtlCol="0">
+              <a:spAutoFit/>
+            </a:bodyPr>
+            <a:lstStyle/>
+            <a:p>
+              <a:r>
+                <a:rPr lang="en-CA" sz="4000" dirty="0" smtClean="0">
+                  <a:ln>
+                    <a:solidFill>
+                      <a:sysClr val="windowText" lastClr="000000"/>
+                    </a:solidFill>
+                  </a:ln>
+                  <a:solidFill>
+                    <a:schemeClr val="bg1"/>
+                  </a:solidFill>
+                </a:rPr>
+                <a:t>P (10,1)</a:t>
+              </a:r>
+              <a:endParaRPr lang="en-CA" sz="4000" dirty="0">
+                <a:ln>
+                  <a:solidFill>
+                    <a:sysClr val="windowText" lastClr="000000"/>
+                  </a:solidFill>
+                </a:ln>
+                <a:solidFill>
+                  <a:schemeClr val="bg1"/>
+                </a:solidFill>
+              </a:endParaRPr>
+            </a:p>
+          </p:txBody>
+        </p:sp>
+        <p:sp>
+          <p:nvSpPr>
+            <p:cNvPr id="22" name="TextBox 21" hidden="1"/>
+            <p:cNvSpPr txBox="1"/>
+            <p:nvPr/>
+          </p:nvSpPr>
+          <p:spPr>
+            <a:xfrm>
+              <a:off x="6824773" y="6257175"/>
+              <a:ext cx="1978866" cy="707886"/>
+            </a:xfrm>
+            <a:prstGeom prst="rect">
+              <a:avLst/>
+            </a:prstGeom>
+            <a:noFill/>
+          </p:spPr>
+          <p:txBody>
+            <a:bodyPr wrap="square" rtlCol="0">
+              <a:spAutoFit/>
+            </a:bodyPr>
+            <a:lstStyle/>
+            <a:p>
+              <a:r>
+                <a:rPr lang="en-CA" sz="4000" dirty="0" smtClean="0">
+                  <a:ln>
+                    <a:solidFill>
+                      <a:sysClr val="windowText" lastClr="000000"/>
+                    </a:solidFill>
+                  </a:ln>
+                  <a:solidFill>
+                    <a:schemeClr val="bg1"/>
+                  </a:solidFill>
+                </a:rPr>
+                <a:t>P (11,1)</a:t>
+              </a:r>
+              <a:endParaRPr lang="en-CA" sz="4000" dirty="0">
+                <a:ln>
+                  <a:solidFill>
+                    <a:sysClr val="windowText" lastClr="000000"/>
+                  </a:solidFill>
+                </a:ln>
+                <a:solidFill>
+                  <a:schemeClr val="bg1"/>
+                </a:solidFill>
+              </a:endParaRPr>
+            </a:p>
+          </p:txBody>
+        </p:sp>
+        <p:sp>
+          <p:nvSpPr>
+            <p:cNvPr id="23" name="TextBox 22" hidden="1"/>
+            <p:cNvSpPr txBox="1"/>
+            <p:nvPr/>
+          </p:nvSpPr>
+          <p:spPr>
+            <a:xfrm>
+              <a:off x="7270613" y="2737042"/>
+              <a:ext cx="1692215" cy="707886"/>
+            </a:xfrm>
+            <a:prstGeom prst="rect">
+              <a:avLst/>
+            </a:prstGeom>
+            <a:noFill/>
+          </p:spPr>
+          <p:txBody>
+            <a:bodyPr wrap="square" rtlCol="0">
+              <a:spAutoFit/>
+            </a:bodyPr>
+            <a:lstStyle/>
+            <a:p>
+              <a:r>
+                <a:rPr lang="en-CA" sz="4000" dirty="0" smtClean="0">
+                  <a:ln>
+                    <a:solidFill>
+                      <a:sysClr val="windowText" lastClr="000000"/>
+                    </a:solidFill>
+                  </a:ln>
+                  <a:solidFill>
+                    <a:schemeClr val="bg1"/>
+                  </a:solidFill>
+                </a:rPr>
+                <a:t>P(8,1)</a:t>
+              </a:r>
+              <a:endParaRPr lang="en-CA" sz="4000" dirty="0">
+                <a:ln>
+                  <a:solidFill>
+                    <a:sysClr val="windowText" lastClr="000000"/>
+                  </a:solidFill>
+                </a:ln>
+                <a:solidFill>
+                  <a:schemeClr val="bg1"/>
+                </a:solidFill>
+              </a:endParaRPr>
+            </a:p>
+          </p:txBody>
+        </p:sp>
+        <p:sp>
+          <p:nvSpPr>
+            <p:cNvPr id="24" name="TextBox 23" hidden="1"/>
+            <p:cNvSpPr txBox="1"/>
+            <p:nvPr/>
+          </p:nvSpPr>
+          <p:spPr>
+            <a:xfrm>
+              <a:off x="7514512" y="925990"/>
+              <a:ext cx="1692215" cy="707886"/>
+            </a:xfrm>
+            <a:prstGeom prst="rect">
+              <a:avLst/>
+            </a:prstGeom>
+            <a:noFill/>
+          </p:spPr>
+          <p:txBody>
+            <a:bodyPr wrap="square" rtlCol="0">
+              <a:spAutoFit/>
+            </a:bodyPr>
+            <a:lstStyle/>
+            <a:p>
+              <a:r>
+                <a:rPr lang="en-CA" sz="4000" dirty="0" smtClean="0">
+                  <a:ln>
+                    <a:solidFill>
+                      <a:sysClr val="windowText" lastClr="000000"/>
+                    </a:solidFill>
+                  </a:ln>
+                  <a:solidFill>
+                    <a:schemeClr val="bg1"/>
+                  </a:solidFill>
+                </a:rPr>
+                <a:t>P(7,1)</a:t>
+              </a:r>
+              <a:endParaRPr lang="en-CA" sz="4000" dirty="0">
+                <a:ln>
+                  <a:solidFill>
+                    <a:sysClr val="windowText" lastClr="000000"/>
+                  </a:solidFill>
+                </a:ln>
+                <a:solidFill>
+                  <a:schemeClr val="bg1"/>
+                </a:solidFill>
+              </a:endParaRPr>
+            </a:p>
+          </p:txBody>
+        </p:sp>
+        <p:sp>
+          <p:nvSpPr>
+            <p:cNvPr id="25" name="TextBox 24" hidden="1"/>
+            <p:cNvSpPr txBox="1"/>
+            <p:nvPr/>
+          </p:nvSpPr>
+          <p:spPr>
+            <a:xfrm>
+              <a:off x="4921454" y="4591480"/>
+              <a:ext cx="1948190" cy="707886"/>
+            </a:xfrm>
+            <a:prstGeom prst="rect">
+              <a:avLst/>
+            </a:prstGeom>
+            <a:noFill/>
+          </p:spPr>
+          <p:txBody>
+            <a:bodyPr wrap="square" rtlCol="0">
+              <a:spAutoFit/>
+            </a:bodyPr>
+            <a:lstStyle/>
+            <a:p>
+              <a:r>
+                <a:rPr lang="en-CA" sz="4000" dirty="0" smtClean="0">
+                  <a:ln>
+                    <a:solidFill>
+                      <a:sysClr val="windowText" lastClr="000000"/>
+                    </a:solidFill>
+                  </a:ln>
+                  <a:solidFill>
+                    <a:schemeClr val="bg1"/>
+                  </a:solidFill>
+                </a:rPr>
+                <a:t>P*(10,0)</a:t>
+              </a:r>
+              <a:endParaRPr lang="en-CA" sz="4000" dirty="0">
+                <a:ln>
+                  <a:solidFill>
+                    <a:sysClr val="windowText" lastClr="000000"/>
+                  </a:solidFill>
+                </a:ln>
+                <a:solidFill>
+                  <a:schemeClr val="bg1"/>
+                </a:solidFill>
+              </a:endParaRPr>
+            </a:p>
+          </p:txBody>
+        </p:sp>
+        <p:sp>
+          <p:nvSpPr>
+            <p:cNvPr id="26" name="TextBox 25"/>
+            <p:cNvSpPr txBox="1"/>
+            <p:nvPr/>
+          </p:nvSpPr>
+          <p:spPr>
+            <a:xfrm>
+              <a:off x="5392272" y="3619111"/>
+              <a:ext cx="2438477" cy="769441"/>
+            </a:xfrm>
+            <a:prstGeom prst="rect">
+              <a:avLst/>
+            </a:prstGeom>
+            <a:noFill/>
+          </p:spPr>
+          <p:txBody>
+            <a:bodyPr wrap="square" rtlCol="0">
+              <a:spAutoFit/>
+            </a:bodyPr>
+            <a:lstStyle/>
+            <a:p>
+              <a:r>
+                <a:rPr lang="en-CA" sz="4400" dirty="0" smtClean="0">
+                  <a:ln>
+                    <a:solidFill>
+                      <a:sysClr val="windowText" lastClr="000000"/>
+                    </a:solidFill>
+                  </a:ln>
+                  <a:solidFill>
+                    <a:srgbClr val="00B050"/>
+                  </a:solidFill>
+                </a:rPr>
+                <a:t>&lt;AP(9,0)&gt;</a:t>
+              </a:r>
+              <a:endParaRPr lang="en-CA" sz="4400" dirty="0">
+                <a:ln>
+                  <a:solidFill>
+                    <a:sysClr val="windowText" lastClr="000000"/>
+                  </a:solidFill>
+                </a:ln>
+                <a:solidFill>
+                  <a:srgbClr val="00B050"/>
+                </a:solidFill>
+              </a:endParaRPr>
+            </a:p>
+          </p:txBody>
+        </p:sp>
+      </p:grpSp>
+    </p:spTree>
+    <p:extLst>
+      <p:ext uri="{BB962C8B-B14F-4D97-AF65-F5344CB8AC3E}">
+        <p14:creationId xmlns:p14="http://schemas.microsoft.com/office/powerpoint/2010/main" val="942439839"/>
+      </p:ext>
+    </p:extLst>
+  </p:cSld>
+  <p:clrMapOvr>
+    <a:masterClrMapping/>
+  </p:clrMapOvr>
+</p:sld>
+</file>
+
+<file path=ppt/slides/slide5.xml><?xml version="1.0" encoding="utf-8"?>
+<p:sld xmlns:a="http://schemas.openxmlformats.org/drawingml/2006/main" xmlns:r="http://schemas.openxmlformats.org/officeDocument/2006/relationships" xmlns:p="http://schemas.openxmlformats.org/presentationml/2006/main">
+  <p:cSld>
+    <p:spTree>
+      <p:nvGrpSpPr>
+        <p:cNvPr id="1" name=""/>
+        <p:cNvGrpSpPr/>
+        <p:nvPr/>
+      </p:nvGrpSpPr>
+      <p:grpSpPr>
+        <a:xfrm>
+          <a:off x="0" y="0"/>
+          <a:ext cx="0" cy="0"/>
+          <a:chOff x="0" y="0"/>
+          <a:chExt cx="0" cy="0"/>
+        </a:xfrm>
+      </p:grpSpPr>
+      <p:grpSp>
+        <p:nvGrpSpPr>
+          <p:cNvPr id="6" name="Group 5"/>
+          <p:cNvGrpSpPr/>
+          <p:nvPr/>
+        </p:nvGrpSpPr>
+        <p:grpSpPr>
+          <a:xfrm>
+            <a:off x="173736" y="713232"/>
+            <a:ext cx="11698224" cy="4837176"/>
+            <a:chOff x="173736" y="713232"/>
+            <a:chExt cx="11698224" cy="4837176"/>
+          </a:xfrm>
+        </p:grpSpPr>
+        <p:pic>
+          <p:nvPicPr>
+            <p:cNvPr id="4" name="Picture 3"/>
+            <p:cNvPicPr>
+              <a:picLocks noChangeAspect="1"/>
+            </p:cNvPicPr>
+            <p:nvPr/>
+          </p:nvPicPr>
+          <p:blipFill rotWithShape="1">
+            <a:blip r:embed="rId2">
+              <a:extLst>
+                <a:ext uri="{28A0092B-C50C-407E-A947-70E740481C1C}">
+                  <a14:useLocalDpi xmlns:a14="http://schemas.microsoft.com/office/drawing/2010/main" val="0"/>
+                </a:ext>
+              </a:extLst>
+            </a:blip>
+            <a:srcRect l="12537" t="21466" r="15072" b="8000"/>
+            <a:stretch/>
+          </p:blipFill>
+          <p:spPr>
+            <a:xfrm>
+              <a:off x="173736" y="713232"/>
+              <a:ext cx="6089904" cy="4837176"/>
+            </a:xfrm>
+            <a:prstGeom prst="rect">
+              <a:avLst/>
+            </a:prstGeom>
+          </p:spPr>
+        </p:pic>
+        <p:pic>
+          <p:nvPicPr>
+            <p:cNvPr id="5" name="Picture 4"/>
+            <p:cNvPicPr>
+              <a:picLocks noChangeAspect="1"/>
+            </p:cNvPicPr>
+            <p:nvPr/>
+          </p:nvPicPr>
+          <p:blipFill rotWithShape="1">
+            <a:blip r:embed="rId3">
+              <a:extLst>
+                <a:ext uri="{28A0092B-C50C-407E-A947-70E740481C1C}">
+                  <a14:useLocalDpi xmlns:a14="http://schemas.microsoft.com/office/drawing/2010/main" val="0"/>
+                </a:ext>
+              </a:extLst>
+            </a:blip>
+            <a:srcRect l="25905" t="22334" r="7428" b="7132"/>
+            <a:stretch/>
+          </p:blipFill>
+          <p:spPr>
+            <a:xfrm>
+              <a:off x="6263640" y="713232"/>
+              <a:ext cx="5608320" cy="4837176"/>
+            </a:xfrm>
+            <a:prstGeom prst="rect">
+              <a:avLst/>
+            </a:prstGeom>
+          </p:spPr>
+        </p:pic>
+      </p:grpSp>
+    </p:spTree>
+    <p:extLst>
+      <p:ext uri="{BB962C8B-B14F-4D97-AF65-F5344CB8AC3E}">
+        <p14:creationId xmlns:p14="http://schemas.microsoft.com/office/powerpoint/2010/main" val="2914908314"/>
+      </p:ext>
+    </p:extLst>
+  </p:cSld>
+  <p:clrMapOvr>
+    <a:masterClrMapping/>
+  </p:clrMapOvr>
+</p:sld>
+</file>
+
+<file path=ppt/slides/slide6.xml><?xml version="1.0" encoding="utf-8"?>
+<p:sld xmlns:a="http://schemas.openxmlformats.org/drawingml/2006/main" xmlns:r="http://schemas.openxmlformats.org/officeDocument/2006/relationships" xmlns:p="http://schemas.openxmlformats.org/presentationml/2006/main">
+  <p:cSld>
+    <p:spTree>
+      <p:nvGrpSpPr>
+        <p:cNvPr id="1" name=""/>
+        <p:cNvGrpSpPr/>
+        <p:nvPr/>
+      </p:nvGrpSpPr>
+      <p:grpSpPr>
+        <a:xfrm>
+          <a:off x="0" y="0"/>
+          <a:ext cx="0" cy="0"/>
+          <a:chOff x="0" y="0"/>
+          <a:chExt cx="0" cy="0"/>
+        </a:xfrm>
+      </p:grpSpPr>
+      <p:grpSp>
+        <p:nvGrpSpPr>
+          <p:cNvPr id="31" name="Group 30"/>
+          <p:cNvGrpSpPr/>
+          <p:nvPr/>
+        </p:nvGrpSpPr>
+        <p:grpSpPr>
+          <a:xfrm>
+            <a:off x="1186249" y="0"/>
+            <a:ext cx="8468496" cy="6858000"/>
+            <a:chOff x="1186249" y="0"/>
+            <a:chExt cx="8468496" cy="6858000"/>
+          </a:xfrm>
+        </p:grpSpPr>
+        <p:pic>
+          <p:nvPicPr>
+            <p:cNvPr id="3" name="Picture 2"/>
+            <p:cNvPicPr>
+              <a:picLocks noChangeAspect="1"/>
+            </p:cNvPicPr>
+            <p:nvPr/>
+          </p:nvPicPr>
+          <p:blipFill rotWithShape="1">
+            <a:blip r:embed="rId2">
+              <a:extLst>
+                <a:ext uri="{28A0092B-C50C-407E-A947-70E740481C1C}">
+                  <a14:useLocalDpi xmlns:a14="http://schemas.microsoft.com/office/drawing/2010/main" val="0"/>
+                </a:ext>
+              </a:extLst>
+            </a:blip>
+            <a:srcRect l="8953" r="33407"/>
+            <a:stretch/>
+          </p:blipFill>
+          <p:spPr>
+            <a:xfrm>
+              <a:off x="1186249" y="0"/>
+              <a:ext cx="4893275" cy="6858000"/>
+            </a:xfrm>
+            <a:prstGeom prst="rect">
+              <a:avLst/>
+            </a:prstGeom>
+          </p:spPr>
+        </p:pic>
+        <p:grpSp>
+          <p:nvGrpSpPr>
+            <p:cNvPr id="18" name="Group 17"/>
+            <p:cNvGrpSpPr/>
+            <p:nvPr/>
+          </p:nvGrpSpPr>
+          <p:grpSpPr>
+            <a:xfrm>
+              <a:off x="1814381" y="4639607"/>
+              <a:ext cx="1970902" cy="1889447"/>
+              <a:chOff x="2226274" y="4840299"/>
+              <a:chExt cx="1970902" cy="1889447"/>
+            </a:xfrm>
+          </p:grpSpPr>
+          <p:cxnSp>
+            <p:nvCxnSpPr>
+              <p:cNvPr id="5" name="Straight Arrow Connector 4"/>
+              <p:cNvCxnSpPr/>
+              <p:nvPr/>
+            </p:nvCxnSpPr>
+            <p:spPr>
+              <a:xfrm flipV="1">
+                <a:off x="2949146" y="5222788"/>
+                <a:ext cx="0" cy="1161536"/>
+              </a:xfrm>
+              <a:prstGeom prst="straightConnector1">
+                <a:avLst/>
+              </a:prstGeom>
+              <a:ln w="76200">
+                <a:solidFill>
+                  <a:schemeClr val="tx1"/>
+                </a:solidFill>
+                <a:tailEnd type="triangle"/>
+              </a:ln>
+            </p:spPr>
+            <p:style>
+              <a:lnRef idx="1">
+                <a:schemeClr val="accent1"/>
+              </a:lnRef>
+              <a:fillRef idx="0">
+                <a:schemeClr val="accent1"/>
+              </a:fillRef>
+              <a:effectRef idx="0">
+                <a:schemeClr val="accent1"/>
+              </a:effectRef>
+              <a:fontRef idx="minor">
+                <a:schemeClr val="tx1"/>
+              </a:fontRef>
+            </p:style>
+          </p:cxnSp>
+          <p:cxnSp>
+            <p:nvCxnSpPr>
+              <p:cNvPr id="7" name="Straight Arrow Connector 6"/>
+              <p:cNvCxnSpPr/>
+              <p:nvPr/>
+            </p:nvCxnSpPr>
+            <p:spPr>
+              <a:xfrm flipV="1">
+                <a:off x="2949146" y="6021860"/>
+                <a:ext cx="947351" cy="362465"/>
+              </a:xfrm>
+              <a:prstGeom prst="straightConnector1">
+                <a:avLst/>
+              </a:prstGeom>
+              <a:ln w="76200">
+                <a:solidFill>
+                  <a:schemeClr val="tx1"/>
+                </a:solidFill>
+                <a:tailEnd type="triangle"/>
+              </a:ln>
+            </p:spPr>
+            <p:style>
+              <a:lnRef idx="1">
+                <a:schemeClr val="accent1"/>
+              </a:lnRef>
+              <a:fillRef idx="0">
+                <a:schemeClr val="accent1"/>
+              </a:fillRef>
+              <a:effectRef idx="0">
+                <a:schemeClr val="accent1"/>
+              </a:effectRef>
+              <a:fontRef idx="minor">
+                <a:schemeClr val="tx1"/>
+              </a:fontRef>
+            </p:style>
+          </p:cxnSp>
+          <p:cxnSp>
+            <p:nvCxnSpPr>
+              <p:cNvPr id="10" name="Straight Arrow Connector 9"/>
+              <p:cNvCxnSpPr/>
+              <p:nvPr/>
+            </p:nvCxnSpPr>
+            <p:spPr>
+              <a:xfrm flipH="1" flipV="1">
+                <a:off x="2611396" y="5803557"/>
+                <a:ext cx="337750" cy="619328"/>
+              </a:xfrm>
+              <a:prstGeom prst="straightConnector1">
+                <a:avLst/>
+              </a:prstGeom>
+              <a:ln w="76200">
+                <a:solidFill>
+                  <a:schemeClr val="tx1"/>
+                </a:solidFill>
+                <a:tailEnd type="triangle"/>
+              </a:ln>
+            </p:spPr>
+            <p:style>
+              <a:lnRef idx="1">
+                <a:schemeClr val="accent1"/>
+              </a:lnRef>
+              <a:fillRef idx="0">
+                <a:schemeClr val="accent1"/>
+              </a:fillRef>
+              <a:effectRef idx="0">
+                <a:schemeClr val="accent1"/>
+              </a:effectRef>
+              <a:fontRef idx="minor">
+                <a:schemeClr val="tx1"/>
+              </a:fontRef>
+            </p:style>
+          </p:cxnSp>
+          <p:sp>
+            <p:nvSpPr>
+              <p:cNvPr id="15" name="TextBox 14"/>
+              <p:cNvSpPr txBox="1"/>
+              <p:nvPr/>
+            </p:nvSpPr>
+            <p:spPr>
+              <a:xfrm>
+                <a:off x="2226274" y="5692914"/>
+                <a:ext cx="576649" cy="707886"/>
+              </a:xfrm>
+              <a:prstGeom prst="rect">
+                <a:avLst/>
+              </a:prstGeom>
+              <a:noFill/>
+            </p:spPr>
+            <p:txBody>
+              <a:bodyPr wrap="square" rtlCol="0">
+                <a:spAutoFit/>
+              </a:bodyPr>
+              <a:lstStyle/>
+              <a:p>
+                <a:r>
+                  <a:rPr lang="en-CA" sz="4000" b="1" dirty="0" smtClean="0"/>
+                  <a:t>A</a:t>
+                </a:r>
+                <a:endParaRPr lang="en-CA" b="1" dirty="0"/>
+              </a:p>
+            </p:txBody>
+          </p:sp>
+          <p:sp>
+            <p:nvSpPr>
+              <p:cNvPr id="16" name="TextBox 15"/>
+              <p:cNvSpPr txBox="1"/>
+              <p:nvPr/>
+            </p:nvSpPr>
+            <p:spPr>
+              <a:xfrm>
+                <a:off x="3620527" y="6021860"/>
+                <a:ext cx="576649" cy="707886"/>
+              </a:xfrm>
+              <a:prstGeom prst="rect">
+                <a:avLst/>
+              </a:prstGeom>
+              <a:noFill/>
+            </p:spPr>
+            <p:txBody>
+              <a:bodyPr wrap="square" rtlCol="0">
+                <a:spAutoFit/>
+              </a:bodyPr>
+              <a:lstStyle/>
+              <a:p>
+                <a:r>
+                  <a:rPr lang="en-CA" sz="4000" b="1" dirty="0" smtClean="0"/>
+                  <a:t>R</a:t>
+                </a:r>
+                <a:endParaRPr lang="en-CA" b="1" dirty="0"/>
+              </a:p>
+            </p:txBody>
+          </p:sp>
+          <p:sp>
+            <p:nvSpPr>
+              <p:cNvPr id="17" name="TextBox 16"/>
+              <p:cNvSpPr txBox="1"/>
+              <p:nvPr/>
+            </p:nvSpPr>
+            <p:spPr>
+              <a:xfrm>
+                <a:off x="2998573" y="4840299"/>
+                <a:ext cx="576649" cy="707886"/>
+              </a:xfrm>
+              <a:prstGeom prst="rect">
+                <a:avLst/>
+              </a:prstGeom>
+              <a:noFill/>
+            </p:spPr>
+            <p:txBody>
+              <a:bodyPr wrap="square" rtlCol="0">
+                <a:spAutoFit/>
+              </a:bodyPr>
+              <a:lstStyle/>
+              <a:p>
+                <a:r>
+                  <a:rPr lang="en-CA" sz="4000" b="1" dirty="0" smtClean="0"/>
+                  <a:t>S</a:t>
+                </a:r>
+                <a:endParaRPr lang="en-CA" b="1" dirty="0"/>
+              </a:p>
+            </p:txBody>
+          </p:sp>
+        </p:grpSp>
+        <p:pic>
+          <p:nvPicPr>
+            <p:cNvPr id="19" name="Picture 18"/>
+            <p:cNvPicPr>
+              <a:picLocks noChangeAspect="1"/>
+            </p:cNvPicPr>
+            <p:nvPr/>
+          </p:nvPicPr>
+          <p:blipFill rotWithShape="1">
+            <a:blip r:embed="rId3">
+              <a:extLst>
+                <a:ext uri="{28A0092B-C50C-407E-A947-70E740481C1C}">
+                  <a14:useLocalDpi xmlns:a14="http://schemas.microsoft.com/office/drawing/2010/main" val="0"/>
+                </a:ext>
+              </a:extLst>
+            </a:blip>
+            <a:srcRect l="33186" r="24312"/>
+            <a:stretch/>
+          </p:blipFill>
+          <p:spPr>
+            <a:xfrm>
+              <a:off x="6046573" y="0"/>
+              <a:ext cx="3608172" cy="6858000"/>
+            </a:xfrm>
+            <a:prstGeom prst="rect">
+              <a:avLst/>
+            </a:prstGeom>
+          </p:spPr>
+        </p:pic>
+        <p:grpSp>
+          <p:nvGrpSpPr>
+            <p:cNvPr id="20" name="Group 19"/>
+            <p:cNvGrpSpPr/>
+            <p:nvPr/>
+          </p:nvGrpSpPr>
+          <p:grpSpPr>
+            <a:xfrm>
+              <a:off x="6382006" y="4639607"/>
+              <a:ext cx="1085593" cy="2218393"/>
+              <a:chOff x="2919027" y="4840299"/>
+              <a:chExt cx="1085593" cy="2218393"/>
+            </a:xfrm>
+          </p:grpSpPr>
+          <p:cxnSp>
+            <p:nvCxnSpPr>
+              <p:cNvPr id="21" name="Straight Arrow Connector 20"/>
+              <p:cNvCxnSpPr/>
+              <p:nvPr/>
+            </p:nvCxnSpPr>
+            <p:spPr>
+              <a:xfrm flipV="1">
+                <a:off x="2949146" y="5222788"/>
+                <a:ext cx="0" cy="1161536"/>
+              </a:xfrm>
+              <a:prstGeom prst="straightConnector1">
+                <a:avLst/>
+              </a:prstGeom>
+              <a:ln w="76200">
+                <a:solidFill>
+                  <a:schemeClr val="tx1"/>
+                </a:solidFill>
+                <a:tailEnd type="triangle"/>
+              </a:ln>
+            </p:spPr>
+            <p:style>
+              <a:lnRef idx="1">
+                <a:schemeClr val="accent1"/>
+              </a:lnRef>
+              <a:fillRef idx="0">
+                <a:schemeClr val="accent1"/>
+              </a:fillRef>
+              <a:effectRef idx="0">
+                <a:schemeClr val="accent1"/>
+              </a:effectRef>
+              <a:fontRef idx="minor">
+                <a:schemeClr val="tx1"/>
+              </a:fontRef>
+            </p:style>
+          </p:cxnSp>
+          <p:cxnSp>
+            <p:nvCxnSpPr>
+              <p:cNvPr id="22" name="Straight Arrow Connector 21"/>
+              <p:cNvCxnSpPr/>
+              <p:nvPr/>
+            </p:nvCxnSpPr>
+            <p:spPr>
+              <a:xfrm flipV="1">
+                <a:off x="2949146" y="5968313"/>
+                <a:ext cx="881449" cy="416013"/>
+              </a:xfrm>
+              <a:prstGeom prst="straightConnector1">
+                <a:avLst/>
+              </a:prstGeom>
+              <a:ln w="76200">
+                <a:solidFill>
+                  <a:schemeClr val="tx1"/>
+                </a:solidFill>
+                <a:tailEnd type="triangle"/>
+              </a:ln>
+            </p:spPr>
+            <p:style>
+              <a:lnRef idx="1">
+                <a:schemeClr val="accent1"/>
+              </a:lnRef>
+              <a:fillRef idx="0">
+                <a:schemeClr val="accent1"/>
+              </a:fillRef>
+              <a:effectRef idx="0">
+                <a:schemeClr val="accent1"/>
+              </a:effectRef>
+              <a:fontRef idx="minor">
+                <a:schemeClr val="tx1"/>
+              </a:fontRef>
+            </p:style>
+          </p:cxnSp>
+          <p:cxnSp>
+            <p:nvCxnSpPr>
+              <p:cNvPr id="23" name="Straight Arrow Connector 22"/>
+              <p:cNvCxnSpPr/>
+              <p:nvPr/>
+            </p:nvCxnSpPr>
+            <p:spPr>
+              <a:xfrm>
+                <a:off x="2919027" y="6350806"/>
+                <a:ext cx="482170" cy="596675"/>
+              </a:xfrm>
+              <a:prstGeom prst="straightConnector1">
+                <a:avLst/>
+              </a:prstGeom>
+              <a:ln w="76200">
+                <a:solidFill>
+                  <a:schemeClr val="tx1"/>
+                </a:solidFill>
+                <a:tailEnd type="triangle"/>
+              </a:ln>
+            </p:spPr>
+            <p:style>
+              <a:lnRef idx="1">
+                <a:schemeClr val="accent1"/>
+              </a:lnRef>
+              <a:fillRef idx="0">
+                <a:schemeClr val="accent1"/>
+              </a:fillRef>
+              <a:effectRef idx="0">
+                <a:schemeClr val="accent1"/>
+              </a:effectRef>
+              <a:fontRef idx="minor">
+                <a:schemeClr val="tx1"/>
+              </a:fontRef>
+            </p:style>
+          </p:cxnSp>
+          <p:sp>
+            <p:nvSpPr>
+              <p:cNvPr id="24" name="TextBox 23"/>
+              <p:cNvSpPr txBox="1"/>
+              <p:nvPr/>
+            </p:nvSpPr>
+            <p:spPr>
+              <a:xfrm>
+                <a:off x="3340958" y="6350806"/>
+                <a:ext cx="576649" cy="707886"/>
+              </a:xfrm>
+              <a:prstGeom prst="rect">
+                <a:avLst/>
+              </a:prstGeom>
+              <a:noFill/>
+            </p:spPr>
+            <p:txBody>
+              <a:bodyPr wrap="square" rtlCol="0">
+                <a:spAutoFit/>
+              </a:bodyPr>
+              <a:lstStyle/>
+              <a:p>
+                <a:r>
+                  <a:rPr lang="en-CA" sz="4000" b="1" dirty="0" smtClean="0"/>
+                  <a:t>R</a:t>
+                </a:r>
+                <a:endParaRPr lang="en-CA" b="1" dirty="0"/>
+              </a:p>
+            </p:txBody>
+          </p:sp>
+          <p:sp>
+            <p:nvSpPr>
+              <p:cNvPr id="25" name="TextBox 24"/>
+              <p:cNvSpPr txBox="1"/>
+              <p:nvPr/>
+            </p:nvSpPr>
+            <p:spPr>
+              <a:xfrm>
+                <a:off x="3427971" y="5386054"/>
+                <a:ext cx="576649" cy="707886"/>
+              </a:xfrm>
+              <a:prstGeom prst="rect">
+                <a:avLst/>
+              </a:prstGeom>
+              <a:noFill/>
+            </p:spPr>
+            <p:txBody>
+              <a:bodyPr wrap="square" rtlCol="0">
+                <a:spAutoFit/>
+              </a:bodyPr>
+              <a:lstStyle/>
+              <a:p>
+                <a:r>
+                  <a:rPr lang="en-CA" sz="4000" b="1" dirty="0" smtClean="0"/>
+                  <a:t>A</a:t>
+                </a:r>
+                <a:endParaRPr lang="en-CA" b="1" dirty="0"/>
+              </a:p>
+            </p:txBody>
+          </p:sp>
+          <p:sp>
+            <p:nvSpPr>
+              <p:cNvPr id="26" name="TextBox 25"/>
+              <p:cNvSpPr txBox="1"/>
+              <p:nvPr/>
+            </p:nvSpPr>
+            <p:spPr>
+              <a:xfrm>
+                <a:off x="2998573" y="4840299"/>
+                <a:ext cx="576649" cy="707886"/>
+              </a:xfrm>
+              <a:prstGeom prst="rect">
+                <a:avLst/>
+              </a:prstGeom>
+              <a:noFill/>
+            </p:spPr>
+            <p:txBody>
+              <a:bodyPr wrap="square" rtlCol="0">
+                <a:spAutoFit/>
+              </a:bodyPr>
+              <a:lstStyle/>
+              <a:p>
+                <a:r>
+                  <a:rPr lang="en-CA" sz="4000" b="1" dirty="0" smtClean="0"/>
+                  <a:t>S</a:t>
+                </a:r>
+                <a:endParaRPr lang="en-CA" b="1" dirty="0"/>
+              </a:p>
+            </p:txBody>
+          </p:sp>
+        </p:grpSp>
+      </p:grpSp>
+    </p:spTree>
+    <p:extLst>
+      <p:ext uri="{BB962C8B-B14F-4D97-AF65-F5344CB8AC3E}">
+        <p14:creationId xmlns:p14="http://schemas.microsoft.com/office/powerpoint/2010/main" val="2085697869"/>
+      </p:ext>
+    </p:extLst>
+  </p:cSld>
+  <p:clrMapOvr>
+    <a:masterClrMapping/>
+  </p:clrMapOvr>
+</p:sld>
+</file>
+
+<file path=ppt/slides/slide7.xml><?xml version="1.0" encoding="utf-8"?>
+<p:sld xmlns:a="http://schemas.openxmlformats.org/drawingml/2006/main" xmlns:r="http://schemas.openxmlformats.org/officeDocument/2006/relationships" xmlns:p="http://schemas.openxmlformats.org/presentationml/2006/main">
+  <p:cSld>
+    <p:spTree>
+      <p:nvGrpSpPr>
+        <p:cNvPr id="1" name=""/>
+        <p:cNvGrpSpPr/>
+        <p:nvPr/>
+      </p:nvGrpSpPr>
+      <p:grpSpPr>
+        <a:xfrm>
+          <a:off x="0" y="0"/>
+          <a:ext cx="0" cy="0"/>
+          <a:chOff x="0" y="0"/>
+          <a:chExt cx="0" cy="0"/>
+        </a:xfrm>
+      </p:grpSpPr>
       <p:pic>
         <p:nvPicPr>
-          <p:cNvPr id="2" name="Picture 1"/>
+          <p:cNvPr id="3" name="Picture 2"/>
           <p:cNvPicPr>
             <a:picLocks noChangeAspect="1"/>
           </p:cNvPicPr>
           <p:nvPr/>
         </p:nvPicPr>
-        <p:blipFill>
+        <p:blipFill rotWithShape="1">
           <a:blip r:embed="rId2">
             <a:extLst>
               <a:ext uri="{28A0092B-C50C-407E-A947-70E740481C1C}">
@@ -3813,24 +6119,184 @@
               </a:ext>
             </a:extLst>
           </a:blip>
-          <a:stretch>
-            <a:fillRect/>
-          </a:stretch>
+          <a:srcRect l="33034" r="28767"/>
+          <a:stretch/>
         </p:blipFill>
         <p:spPr>
           <a:xfrm>
-            <a:off x="1889055" y="0"/>
-            <a:ext cx="8413890" cy="6858000"/>
+            <a:off x="7743566" y="-98854"/>
+            <a:ext cx="3245709" cy="6858000"/>
           </a:xfrm>
           <a:prstGeom prst="rect">
             <a:avLst/>
           </a:prstGeom>
         </p:spPr>
       </p:pic>
+      <p:grpSp>
+        <p:nvGrpSpPr>
+          <p:cNvPr id="11" name="Group 10"/>
+          <p:cNvGrpSpPr/>
+          <p:nvPr/>
+        </p:nvGrpSpPr>
+        <p:grpSpPr>
+          <a:xfrm>
+            <a:off x="2245179" y="0"/>
+            <a:ext cx="3340075" cy="6858000"/>
+            <a:chOff x="2245179" y="0"/>
+            <a:chExt cx="3340075" cy="6858000"/>
+          </a:xfrm>
+        </p:grpSpPr>
+        <p:pic>
+          <p:nvPicPr>
+            <p:cNvPr id="2" name="Picture 1"/>
+            <p:cNvPicPr>
+              <a:picLocks noChangeAspect="1"/>
+            </p:cNvPicPr>
+            <p:nvPr/>
+          </p:nvPicPr>
+          <p:blipFill rotWithShape="1">
+            <a:blip r:embed="rId3">
+              <a:extLst>
+                <a:ext uri="{28A0092B-C50C-407E-A947-70E740481C1C}">
+                  <a14:useLocalDpi xmlns:a14="http://schemas.microsoft.com/office/drawing/2010/main" val="0"/>
+                </a:ext>
+              </a:extLst>
+            </a:blip>
+            <a:srcRect l="32646" r="30513"/>
+            <a:stretch/>
+          </p:blipFill>
+          <p:spPr>
+            <a:xfrm>
+              <a:off x="2454876" y="0"/>
+              <a:ext cx="3130378" cy="6858000"/>
+            </a:xfrm>
+            <a:prstGeom prst="rect">
+              <a:avLst/>
+            </a:prstGeom>
+          </p:spPr>
+        </p:pic>
+        <p:cxnSp>
+          <p:nvCxnSpPr>
+            <p:cNvPr id="5" name="Straight Connector 4"/>
+            <p:cNvCxnSpPr/>
+            <p:nvPr/>
+          </p:nvCxnSpPr>
+          <p:spPr>
+            <a:xfrm flipH="1" flipV="1">
+              <a:off x="3477933" y="3313670"/>
+              <a:ext cx="1216069" cy="337751"/>
+            </a:xfrm>
+            <a:prstGeom prst="line">
+              <a:avLst/>
+            </a:prstGeom>
+            <a:ln w="76200">
+              <a:solidFill>
+                <a:srgbClr val="FF0000"/>
+              </a:solidFill>
+            </a:ln>
+          </p:spPr>
+          <p:style>
+            <a:lnRef idx="1">
+              <a:schemeClr val="accent1"/>
+            </a:lnRef>
+            <a:fillRef idx="0">
+              <a:schemeClr val="accent1"/>
+            </a:fillRef>
+            <a:effectRef idx="0">
+              <a:schemeClr val="accent1"/>
+            </a:effectRef>
+            <a:fontRef idx="minor">
+              <a:schemeClr val="tx1"/>
+            </a:fontRef>
+          </p:style>
+        </p:cxnSp>
+        <p:cxnSp>
+          <p:nvCxnSpPr>
+            <p:cNvPr id="8" name="Straight Connector 7"/>
+            <p:cNvCxnSpPr/>
+            <p:nvPr/>
+          </p:nvCxnSpPr>
+          <p:spPr>
+            <a:xfrm flipH="1">
+              <a:off x="3328087" y="747585"/>
+              <a:ext cx="1250586" cy="471615"/>
+            </a:xfrm>
+            <a:prstGeom prst="line">
+              <a:avLst/>
+            </a:prstGeom>
+            <a:ln w="76200">
+              <a:solidFill>
+                <a:srgbClr val="FF0000"/>
+              </a:solidFill>
+            </a:ln>
+          </p:spPr>
+          <p:style>
+            <a:lnRef idx="1">
+              <a:schemeClr val="accent1"/>
+            </a:lnRef>
+            <a:fillRef idx="0">
+              <a:schemeClr val="accent1"/>
+            </a:fillRef>
+            <a:effectRef idx="0">
+              <a:schemeClr val="accent1"/>
+            </a:effectRef>
+            <a:fontRef idx="minor">
+              <a:schemeClr val="tx1"/>
+            </a:fontRef>
+          </p:style>
+        </p:cxnSp>
+        <p:sp>
+          <p:nvSpPr>
+            <p:cNvPr id="10" name="Arc 9"/>
+            <p:cNvSpPr/>
+            <p:nvPr/>
+          </p:nvSpPr>
+          <p:spPr>
+            <a:xfrm rot="218159">
+              <a:off x="2245179" y="982862"/>
+              <a:ext cx="2037871" cy="2907123"/>
+            </a:xfrm>
+            <a:prstGeom prst="arc">
+              <a:avLst>
+                <a:gd name="adj1" fmla="val 17044511"/>
+                <a:gd name="adj2" fmla="val 3054902"/>
+              </a:avLst>
+            </a:prstGeom>
+            <a:ln w="57150">
+              <a:solidFill>
+                <a:srgbClr val="FF0000"/>
+              </a:solidFill>
+              <a:prstDash val="dash"/>
+            </a:ln>
+          </p:spPr>
+          <p:style>
+            <a:lnRef idx="1">
+              <a:schemeClr val="accent1"/>
+            </a:lnRef>
+            <a:fillRef idx="0">
+              <a:schemeClr val="accent1"/>
+            </a:fillRef>
+            <a:effectRef idx="0">
+              <a:schemeClr val="accent1"/>
+            </a:effectRef>
+            <a:fontRef idx="minor">
+              <a:schemeClr val="tx1"/>
+            </a:fontRef>
+          </p:style>
+          <p:txBody>
+            <a:bodyPr rtlCol="0" anchor="ctr"/>
+            <a:lstStyle/>
+            <a:p>
+              <a:pPr algn="ctr"/>
+              <a:endParaRPr lang="en-CA"/>
+            </a:p>
+          </p:txBody>
+        </p:sp>
+      </p:grpSp>
     </p:spTree>
     <p:extLst>
       <p:ext uri="{BB962C8B-B14F-4D97-AF65-F5344CB8AC3E}">
-        <p14:creationId xmlns:p14="http://schemas.microsoft.com/office/powerpoint/2010/main" val="942439839"/>
+        <p14:creationId xmlns:p14="http://schemas.microsoft.com/office/powerpoint/2010/main" val="2311134006"/>
       </p:ext>
     </p:extLst>
   </p:cSld>

</xml_diff>

<commit_message>
synch for paper grab
</commit_message>
<xml_diff>
--- a/SPIE2017/FullPaperImages/FigureConstruction.pptx
+++ b/SPIE2017/FullPaperImages/FigureConstruction.pptx
@@ -12,6 +12,8 @@
     <p:sldId id="261" r:id="rId6"/>
     <p:sldId id="262" r:id="rId7"/>
     <p:sldId id="263" r:id="rId8"/>
+    <p:sldId id="264" r:id="rId9"/>
+    <p:sldId id="265" r:id="rId10"/>
   </p:sldIdLst>
   <p:sldSz cx="12192000" cy="6858000"/>
   <p:notesSz cx="6858000" cy="9144000"/>
@@ -249,7 +251,7 @@
           <a:p>
             <a:fld id="{4C5EB40B-4F9C-4B3F-8313-68E377370307}" type="datetimeFigureOut">
               <a:rPr lang="en-US" smtClean="0"/>
-              <a:t>11/18/2016</a:t>
+              <a:t>11/22/2016</a:t>
             </a:fld>
             <a:endParaRPr lang="en-US"/>
           </a:p>
@@ -419,7 +421,7 @@
           <a:p>
             <a:fld id="{4C5EB40B-4F9C-4B3F-8313-68E377370307}" type="datetimeFigureOut">
               <a:rPr lang="en-US" smtClean="0"/>
-              <a:t>11/18/2016</a:t>
+              <a:t>11/22/2016</a:t>
             </a:fld>
             <a:endParaRPr lang="en-US"/>
           </a:p>
@@ -599,7 +601,7 @@
           <a:p>
             <a:fld id="{4C5EB40B-4F9C-4B3F-8313-68E377370307}" type="datetimeFigureOut">
               <a:rPr lang="en-US" smtClean="0"/>
-              <a:t>11/18/2016</a:t>
+              <a:t>11/22/2016</a:t>
             </a:fld>
             <a:endParaRPr lang="en-US"/>
           </a:p>
@@ -769,7 +771,7 @@
           <a:p>
             <a:fld id="{4C5EB40B-4F9C-4B3F-8313-68E377370307}" type="datetimeFigureOut">
               <a:rPr lang="en-US" smtClean="0"/>
-              <a:t>11/18/2016</a:t>
+              <a:t>11/22/2016</a:t>
             </a:fld>
             <a:endParaRPr lang="en-US"/>
           </a:p>
@@ -1015,7 +1017,7 @@
           <a:p>
             <a:fld id="{4C5EB40B-4F9C-4B3F-8313-68E377370307}" type="datetimeFigureOut">
               <a:rPr lang="en-US" smtClean="0"/>
-              <a:t>11/18/2016</a:t>
+              <a:t>11/22/2016</a:t>
             </a:fld>
             <a:endParaRPr lang="en-US"/>
           </a:p>
@@ -1247,7 +1249,7 @@
           <a:p>
             <a:fld id="{4C5EB40B-4F9C-4B3F-8313-68E377370307}" type="datetimeFigureOut">
               <a:rPr lang="en-US" smtClean="0"/>
-              <a:t>11/18/2016</a:t>
+              <a:t>11/22/2016</a:t>
             </a:fld>
             <a:endParaRPr lang="en-US"/>
           </a:p>
@@ -1614,7 +1616,7 @@
           <a:p>
             <a:fld id="{4C5EB40B-4F9C-4B3F-8313-68E377370307}" type="datetimeFigureOut">
               <a:rPr lang="en-US" smtClean="0"/>
-              <a:t>11/18/2016</a:t>
+              <a:t>11/22/2016</a:t>
             </a:fld>
             <a:endParaRPr lang="en-US"/>
           </a:p>
@@ -1732,7 +1734,7 @@
           <a:p>
             <a:fld id="{4C5EB40B-4F9C-4B3F-8313-68E377370307}" type="datetimeFigureOut">
               <a:rPr lang="en-US" smtClean="0"/>
-              <a:t>11/18/2016</a:t>
+              <a:t>11/22/2016</a:t>
             </a:fld>
             <a:endParaRPr lang="en-US"/>
           </a:p>
@@ -1827,7 +1829,7 @@
           <a:p>
             <a:fld id="{4C5EB40B-4F9C-4B3F-8313-68E377370307}" type="datetimeFigureOut">
               <a:rPr lang="en-US" smtClean="0"/>
-              <a:t>11/18/2016</a:t>
+              <a:t>11/22/2016</a:t>
             </a:fld>
             <a:endParaRPr lang="en-US"/>
           </a:p>
@@ -2104,7 +2106,7 @@
           <a:p>
             <a:fld id="{4C5EB40B-4F9C-4B3F-8313-68E377370307}" type="datetimeFigureOut">
               <a:rPr lang="en-US" smtClean="0"/>
-              <a:t>11/18/2016</a:t>
+              <a:t>11/22/2016</a:t>
             </a:fld>
             <a:endParaRPr lang="en-US"/>
           </a:p>
@@ -2357,7 +2359,7 @@
           <a:p>
             <a:fld id="{4C5EB40B-4F9C-4B3F-8313-68E377370307}" type="datetimeFigureOut">
               <a:rPr lang="en-US" smtClean="0"/>
-              <a:t>11/18/2016</a:t>
+              <a:t>11/22/2016</a:t>
             </a:fld>
             <a:endParaRPr lang="en-US"/>
           </a:p>
@@ -2570,7 +2572,7 @@
           <a:p>
             <a:fld id="{4C5EB40B-4F9C-4B3F-8313-68E377370307}" type="datetimeFigureOut">
               <a:rPr lang="en-US" smtClean="0"/>
-              <a:t>11/18/2016</a:t>
+              <a:t>11/22/2016</a:t>
             </a:fld>
             <a:endParaRPr lang="en-US"/>
           </a:p>
@@ -6306,6 +6308,420 @@
 </p:sld>
 </file>
 
+<file path=ppt/slides/slide8.xml><?xml version="1.0" encoding="utf-8"?>
+<p:sld xmlns:a="http://schemas.openxmlformats.org/drawingml/2006/main" xmlns:r="http://schemas.openxmlformats.org/officeDocument/2006/relationships" xmlns:p="http://schemas.openxmlformats.org/presentationml/2006/main">
+  <p:cSld>
+    <p:spTree>
+      <p:nvGrpSpPr>
+        <p:cNvPr id="1" name=""/>
+        <p:cNvGrpSpPr/>
+        <p:nvPr/>
+      </p:nvGrpSpPr>
+      <p:grpSpPr>
+        <a:xfrm>
+          <a:off x="0" y="0"/>
+          <a:ext cx="0" cy="0"/>
+          <a:chOff x="0" y="0"/>
+          <a:chExt cx="0" cy="0"/>
+        </a:xfrm>
+      </p:grpSpPr>
+      <p:grpSp>
+        <p:nvGrpSpPr>
+          <p:cNvPr id="8" name="Group 7"/>
+          <p:cNvGrpSpPr/>
+          <p:nvPr/>
+        </p:nvGrpSpPr>
+        <p:grpSpPr>
+          <a:xfrm>
+            <a:off x="3768812" y="0"/>
+            <a:ext cx="4518454" cy="6858000"/>
+            <a:chOff x="3768812" y="0"/>
+            <a:chExt cx="4518454" cy="6858000"/>
+          </a:xfrm>
+        </p:grpSpPr>
+        <p:pic>
+          <p:nvPicPr>
+            <p:cNvPr id="2" name="Picture 1"/>
+            <p:cNvPicPr>
+              <a:picLocks noChangeAspect="1"/>
+            </p:cNvPicPr>
+            <p:nvPr/>
+          </p:nvPicPr>
+          <p:blipFill rotWithShape="1">
+            <a:blip r:embed="rId2">
+              <a:extLst>
+                <a:ext uri="{28A0092B-C50C-407E-A947-70E740481C1C}">
+                  <a14:useLocalDpi xmlns:a14="http://schemas.microsoft.com/office/drawing/2010/main" val="0"/>
+                </a:ext>
+              </a:extLst>
+            </a:blip>
+            <a:srcRect l="19307" r="19872"/>
+            <a:stretch/>
+          </p:blipFill>
+          <p:spPr>
+            <a:xfrm>
+              <a:off x="3863546" y="0"/>
+              <a:ext cx="4423720" cy="6858000"/>
+            </a:xfrm>
+            <a:prstGeom prst="rect">
+              <a:avLst/>
+            </a:prstGeom>
+          </p:spPr>
+        </p:pic>
+        <p:cxnSp>
+          <p:nvCxnSpPr>
+            <p:cNvPr id="4" name="Straight Connector 3"/>
+            <p:cNvCxnSpPr/>
+            <p:nvPr/>
+          </p:nvCxnSpPr>
+          <p:spPr>
+            <a:xfrm flipH="1" flipV="1">
+              <a:off x="4604951" y="3056238"/>
+              <a:ext cx="1449860" cy="593124"/>
+            </a:xfrm>
+            <a:prstGeom prst="line">
+              <a:avLst/>
+            </a:prstGeom>
+            <a:ln w="38100">
+              <a:solidFill>
+                <a:srgbClr val="FF0000"/>
+              </a:solidFill>
+            </a:ln>
+          </p:spPr>
+          <p:style>
+            <a:lnRef idx="1">
+              <a:schemeClr val="accent1"/>
+            </a:lnRef>
+            <a:fillRef idx="0">
+              <a:schemeClr val="accent1"/>
+            </a:fillRef>
+            <a:effectRef idx="0">
+              <a:schemeClr val="accent1"/>
+            </a:effectRef>
+            <a:fontRef idx="minor">
+              <a:schemeClr val="tx1"/>
+            </a:fontRef>
+          </p:style>
+        </p:cxnSp>
+        <p:cxnSp>
+          <p:nvCxnSpPr>
+            <p:cNvPr id="6" name="Straight Connector 5"/>
+            <p:cNvCxnSpPr/>
+            <p:nvPr/>
+          </p:nvCxnSpPr>
+          <p:spPr>
+            <a:xfrm flipH="1">
+              <a:off x="4621427" y="1449859"/>
+              <a:ext cx="1606378" cy="601363"/>
+            </a:xfrm>
+            <a:prstGeom prst="line">
+              <a:avLst/>
+            </a:prstGeom>
+            <a:ln w="38100">
+              <a:solidFill>
+                <a:srgbClr val="FF0000"/>
+              </a:solidFill>
+            </a:ln>
+          </p:spPr>
+          <p:style>
+            <a:lnRef idx="1">
+              <a:schemeClr val="accent1"/>
+            </a:lnRef>
+            <a:fillRef idx="0">
+              <a:schemeClr val="accent1"/>
+            </a:fillRef>
+            <a:effectRef idx="0">
+              <a:schemeClr val="accent1"/>
+            </a:effectRef>
+            <a:fontRef idx="minor">
+              <a:schemeClr val="tx1"/>
+            </a:fontRef>
+          </p:style>
+        </p:cxnSp>
+        <p:sp>
+          <p:nvSpPr>
+            <p:cNvPr id="7" name="Arc 6"/>
+            <p:cNvSpPr/>
+            <p:nvPr/>
+          </p:nvSpPr>
+          <p:spPr>
+            <a:xfrm rot="3018043">
+              <a:off x="3805882" y="1908554"/>
+              <a:ext cx="1400433" cy="1474573"/>
+            </a:xfrm>
+            <a:prstGeom prst="arc">
+              <a:avLst>
+                <a:gd name="adj1" fmla="val 14678364"/>
+                <a:gd name="adj2" fmla="val 0"/>
+              </a:avLst>
+            </a:prstGeom>
+            <a:ln w="38100">
+              <a:solidFill>
+                <a:srgbClr val="FF0000"/>
+              </a:solidFill>
+            </a:ln>
+          </p:spPr>
+          <p:style>
+            <a:lnRef idx="1">
+              <a:schemeClr val="accent1"/>
+            </a:lnRef>
+            <a:fillRef idx="0">
+              <a:schemeClr val="accent1"/>
+            </a:fillRef>
+            <a:effectRef idx="0">
+              <a:schemeClr val="accent1"/>
+            </a:effectRef>
+            <a:fontRef idx="minor">
+              <a:schemeClr val="tx1"/>
+            </a:fontRef>
+          </p:style>
+          <p:txBody>
+            <a:bodyPr rtlCol="0" anchor="ctr"/>
+            <a:lstStyle/>
+            <a:p>
+              <a:pPr algn="ctr"/>
+              <a:endParaRPr lang="en-CA"/>
+            </a:p>
+          </p:txBody>
+        </p:sp>
+      </p:grpSp>
+    </p:spTree>
+    <p:extLst>
+      <p:ext uri="{BB962C8B-B14F-4D97-AF65-F5344CB8AC3E}">
+        <p14:creationId xmlns:p14="http://schemas.microsoft.com/office/powerpoint/2010/main" val="3044873603"/>
+      </p:ext>
+    </p:extLst>
+  </p:cSld>
+  <p:clrMapOvr>
+    <a:masterClrMapping/>
+  </p:clrMapOvr>
+</p:sld>
+</file>
+
+<file path=ppt/slides/slide9.xml><?xml version="1.0" encoding="utf-8"?>
+<p:sld xmlns:a="http://schemas.openxmlformats.org/drawingml/2006/main" xmlns:r="http://schemas.openxmlformats.org/officeDocument/2006/relationships" xmlns:p="http://schemas.openxmlformats.org/presentationml/2006/main">
+  <p:cSld>
+    <p:spTree>
+      <p:nvGrpSpPr>
+        <p:cNvPr id="1" name=""/>
+        <p:cNvGrpSpPr/>
+        <p:nvPr/>
+      </p:nvGrpSpPr>
+      <p:grpSpPr>
+        <a:xfrm>
+          <a:off x="0" y="0"/>
+          <a:ext cx="0" cy="0"/>
+          <a:chOff x="0" y="0"/>
+          <a:chExt cx="0" cy="0"/>
+        </a:xfrm>
+      </p:grpSpPr>
+      <p:grpSp>
+        <p:nvGrpSpPr>
+          <p:cNvPr id="11" name="Group 10"/>
+          <p:cNvGrpSpPr/>
+          <p:nvPr/>
+        </p:nvGrpSpPr>
+        <p:grpSpPr>
+          <a:xfrm>
+            <a:off x="3641124" y="1252151"/>
+            <a:ext cx="4250725" cy="4390768"/>
+            <a:chOff x="3641124" y="1252151"/>
+            <a:chExt cx="4250725" cy="4390768"/>
+          </a:xfrm>
+        </p:grpSpPr>
+        <p:pic>
+          <p:nvPicPr>
+            <p:cNvPr id="3" name="Picture 2"/>
+            <p:cNvPicPr>
+              <a:picLocks noChangeAspect="1"/>
+            </p:cNvPicPr>
+            <p:nvPr/>
+          </p:nvPicPr>
+          <p:blipFill rotWithShape="1">
+            <a:blip r:embed="rId2">
+              <a:extLst>
+                <a:ext uri="{28A0092B-C50C-407E-A947-70E740481C1C}">
+                  <a14:useLocalDpi xmlns:a14="http://schemas.microsoft.com/office/drawing/2010/main" val="0"/>
+                </a:ext>
+              </a:extLst>
+            </a:blip>
+            <a:srcRect l="28078" t="16764" r="29662" b="16555"/>
+            <a:stretch/>
+          </p:blipFill>
+          <p:spPr>
+            <a:xfrm>
+              <a:off x="3641124" y="1252151"/>
+              <a:ext cx="4250725" cy="4390768"/>
+            </a:xfrm>
+            <a:prstGeom prst="rect">
+              <a:avLst/>
+            </a:prstGeom>
+          </p:spPr>
+        </p:pic>
+        <p:cxnSp>
+          <p:nvCxnSpPr>
+            <p:cNvPr id="5" name="Straight Connector 4"/>
+            <p:cNvCxnSpPr/>
+            <p:nvPr/>
+          </p:nvCxnSpPr>
+          <p:spPr>
+            <a:xfrm>
+              <a:off x="5436973" y="1820562"/>
+              <a:ext cx="107092" cy="428368"/>
+            </a:xfrm>
+            <a:prstGeom prst="line">
+              <a:avLst/>
+            </a:prstGeom>
+            <a:ln w="28575">
+              <a:solidFill>
+                <a:srgbClr val="FF0000"/>
+              </a:solidFill>
+              <a:headEnd type="arrow" w="med" len="med"/>
+              <a:tailEnd type="arrow" w="med" len="med"/>
+            </a:ln>
+          </p:spPr>
+          <p:style>
+            <a:lnRef idx="1">
+              <a:schemeClr val="accent1"/>
+            </a:lnRef>
+            <a:fillRef idx="0">
+              <a:schemeClr val="accent1"/>
+            </a:fillRef>
+            <a:effectRef idx="0">
+              <a:schemeClr val="accent1"/>
+            </a:effectRef>
+            <a:fontRef idx="minor">
+              <a:schemeClr val="tx1"/>
+            </a:fontRef>
+          </p:style>
+        </p:cxnSp>
+        <p:sp>
+          <p:nvSpPr>
+            <p:cNvPr id="6" name="TextBox 5"/>
+            <p:cNvSpPr txBox="1"/>
+            <p:nvPr/>
+          </p:nvSpPr>
+          <p:spPr>
+            <a:xfrm>
+              <a:off x="5490519" y="1417933"/>
+              <a:ext cx="766119" cy="830997"/>
+            </a:xfrm>
+            <a:prstGeom prst="rect">
+              <a:avLst/>
+            </a:prstGeom>
+            <a:noFill/>
+          </p:spPr>
+          <p:txBody>
+            <a:bodyPr wrap="square" rtlCol="0">
+              <a:spAutoFit/>
+            </a:bodyPr>
+            <a:lstStyle/>
+            <a:p>
+              <a:r>
+                <a:rPr lang="en-CA" sz="2400" b="1" dirty="0" smtClean="0">
+                  <a:solidFill>
+                    <a:srgbClr val="FF0000"/>
+                  </a:solidFill>
+                </a:rPr>
+                <a:t>12.1mm</a:t>
+              </a:r>
+              <a:endParaRPr lang="en-CA" sz="2400" b="1" dirty="0">
+                <a:solidFill>
+                  <a:srgbClr val="FF0000"/>
+                </a:solidFill>
+              </a:endParaRPr>
+            </a:p>
+          </p:txBody>
+        </p:sp>
+        <p:cxnSp>
+          <p:nvCxnSpPr>
+            <p:cNvPr id="7" name="Straight Connector 6"/>
+            <p:cNvCxnSpPr/>
+            <p:nvPr/>
+          </p:nvCxnSpPr>
+          <p:spPr>
+            <a:xfrm>
+              <a:off x="4777946" y="3814119"/>
+              <a:ext cx="201827" cy="300682"/>
+            </a:xfrm>
+            <a:prstGeom prst="line">
+              <a:avLst/>
+            </a:prstGeom>
+            <a:ln w="28575">
+              <a:solidFill>
+                <a:srgbClr val="FF0000"/>
+              </a:solidFill>
+              <a:headEnd type="arrow" w="med" len="med"/>
+              <a:tailEnd type="arrow" w="med" len="med"/>
+            </a:ln>
+          </p:spPr>
+          <p:style>
+            <a:lnRef idx="1">
+              <a:schemeClr val="accent1"/>
+            </a:lnRef>
+            <a:fillRef idx="0">
+              <a:schemeClr val="accent1"/>
+            </a:fillRef>
+            <a:effectRef idx="0">
+              <a:schemeClr val="accent1"/>
+            </a:effectRef>
+            <a:fontRef idx="minor">
+              <a:schemeClr val="tx1"/>
+            </a:fontRef>
+          </p:style>
+        </p:cxnSp>
+        <p:sp>
+          <p:nvSpPr>
+            <p:cNvPr id="10" name="TextBox 9"/>
+            <p:cNvSpPr txBox="1"/>
+            <p:nvPr/>
+          </p:nvSpPr>
+          <p:spPr>
+            <a:xfrm>
+              <a:off x="4213654" y="3447535"/>
+              <a:ext cx="766119" cy="830997"/>
+            </a:xfrm>
+            <a:prstGeom prst="rect">
+              <a:avLst/>
+            </a:prstGeom>
+            <a:noFill/>
+          </p:spPr>
+          <p:txBody>
+            <a:bodyPr wrap="square" rtlCol="0">
+              <a:spAutoFit/>
+            </a:bodyPr>
+            <a:lstStyle/>
+            <a:p>
+              <a:r>
+                <a:rPr lang="en-CA" sz="2400" b="1" dirty="0" smtClean="0">
+                  <a:solidFill>
+                    <a:srgbClr val="FF0000"/>
+                  </a:solidFill>
+                </a:rPr>
+                <a:t>10.1mm</a:t>
+              </a:r>
+              <a:endParaRPr lang="en-CA" sz="2400" b="1" dirty="0">
+                <a:solidFill>
+                  <a:srgbClr val="FF0000"/>
+                </a:solidFill>
+              </a:endParaRPr>
+            </a:p>
+          </p:txBody>
+        </p:sp>
+      </p:grpSp>
+    </p:spTree>
+    <p:extLst>
+      <p:ext uri="{BB962C8B-B14F-4D97-AF65-F5344CB8AC3E}">
+        <p14:creationId xmlns:p14="http://schemas.microsoft.com/office/powerpoint/2010/main" val="3250351602"/>
+      </p:ext>
+    </p:extLst>
+  </p:cSld>
+  <p:clrMapOvr>
+    <a:masterClrMapping/>
+  </p:clrMapOvr>
+</p:sld>
+</file>
+
 <file path=ppt/theme/theme1.xml><?xml version="1.0" encoding="utf-8"?>
 <a:theme xmlns:a="http://schemas.openxmlformats.org/drawingml/2006/main" name="Office Theme">
   <a:themeElements>

</xml_diff>